<commit_message>
Updated value of MAENORM
</commit_message>
<xml_diff>
--- a/Figures/03_MAE_Schematic.pptx
+++ b/Figures/03_MAE_Schematic.pptx
@@ -130,7 +130,7 @@
   <pc:docChgLst>
     <pc:chgData name="Fatima Pillosu" userId="a6295d4dc9e22643" providerId="LiveId" clId="{87453732-75AC-4426-B5D3-B7C69C2D4F54}"/>
     <pc:docChg chg="undo custSel addSld modSld sldOrd">
-      <pc:chgData name="Fatima Pillosu" userId="a6295d4dc9e22643" providerId="LiveId" clId="{87453732-75AC-4426-B5D3-B7C69C2D4F54}" dt="2026-02-03T21:17:32.629" v="1195" actId="1037"/>
+      <pc:chgData name="Fatima Pillosu" userId="a6295d4dc9e22643" providerId="LiveId" clId="{87453732-75AC-4426-B5D3-B7C69C2D4F54}" dt="2026-02-08T23:15:50.669" v="1199" actId="20577"/>
       <pc:docMkLst>
         <pc:docMk/>
       </pc:docMkLst>
@@ -140,78 +140,6 @@
           <pc:docMk/>
           <pc:sldMk cId="1564045347" sldId="257"/>
         </pc:sldMkLst>
-        <pc:spChg chg="add mod">
-          <ac:chgData name="Fatima Pillosu" userId="a6295d4dc9e22643" providerId="LiveId" clId="{87453732-75AC-4426-B5D3-B7C69C2D4F54}" dt="2026-02-03T17:34:58.335" v="8" actId="571"/>
-          <ac:spMkLst>
-            <pc:docMk/>
-            <pc:sldMk cId="1564045347" sldId="257"/>
-            <ac:spMk id="4" creationId="{B8750115-0F6E-B09C-0F93-E7F3FFEC9F65}"/>
-          </ac:spMkLst>
-        </pc:spChg>
-        <pc:spChg chg="add mod">
-          <ac:chgData name="Fatima Pillosu" userId="a6295d4dc9e22643" providerId="LiveId" clId="{87453732-75AC-4426-B5D3-B7C69C2D4F54}" dt="2026-02-03T17:34:58.335" v="8" actId="571"/>
-          <ac:spMkLst>
-            <pc:docMk/>
-            <pc:sldMk cId="1564045347" sldId="257"/>
-            <ac:spMk id="5" creationId="{B98C174D-42D5-9208-90F7-80071D93D560}"/>
-          </ac:spMkLst>
-        </pc:spChg>
-        <pc:spChg chg="add mod">
-          <ac:chgData name="Fatima Pillosu" userId="a6295d4dc9e22643" providerId="LiveId" clId="{87453732-75AC-4426-B5D3-B7C69C2D4F54}" dt="2026-02-03T17:34:58.335" v="8" actId="571"/>
-          <ac:spMkLst>
-            <pc:docMk/>
-            <pc:sldMk cId="1564045347" sldId="257"/>
-            <ac:spMk id="6" creationId="{4A488F8B-D0AC-84BB-CC71-944D19304174}"/>
-          </ac:spMkLst>
-        </pc:spChg>
-        <pc:spChg chg="add mod">
-          <ac:chgData name="Fatima Pillosu" userId="a6295d4dc9e22643" providerId="LiveId" clId="{87453732-75AC-4426-B5D3-B7C69C2D4F54}" dt="2026-02-03T17:34:58.335" v="8" actId="571"/>
-          <ac:spMkLst>
-            <pc:docMk/>
-            <pc:sldMk cId="1564045347" sldId="257"/>
-            <ac:spMk id="7" creationId="{BF1A1D51-EF25-441F-8113-25DDEA78925B}"/>
-          </ac:spMkLst>
-        </pc:spChg>
-        <pc:spChg chg="del">
-          <ac:chgData name="Fatima Pillosu" userId="a6295d4dc9e22643" providerId="LiveId" clId="{87453732-75AC-4426-B5D3-B7C69C2D4F54}" dt="2026-02-03T17:13:47.568" v="0" actId="21"/>
-          <ac:spMkLst>
-            <pc:docMk/>
-            <pc:sldMk cId="1564045347" sldId="257"/>
-            <ac:spMk id="8" creationId="{4F8CCB1E-88E4-1CBC-D86A-A4996B65CF5B}"/>
-          </ac:spMkLst>
-        </pc:spChg>
-        <pc:spChg chg="add mod">
-          <ac:chgData name="Fatima Pillosu" userId="a6295d4dc9e22643" providerId="LiveId" clId="{87453732-75AC-4426-B5D3-B7C69C2D4F54}" dt="2026-02-03T17:34:58.335" v="8" actId="571"/>
-          <ac:spMkLst>
-            <pc:docMk/>
-            <pc:sldMk cId="1564045347" sldId="257"/>
-            <ac:spMk id="8" creationId="{85F86FF5-62B1-D0B0-2602-2C26AB53BA3D}"/>
-          </ac:spMkLst>
-        </pc:spChg>
-        <pc:spChg chg="del">
-          <ac:chgData name="Fatima Pillosu" userId="a6295d4dc9e22643" providerId="LiveId" clId="{87453732-75AC-4426-B5D3-B7C69C2D4F54}" dt="2026-02-03T17:13:47.568" v="0" actId="21"/>
-          <ac:spMkLst>
-            <pc:docMk/>
-            <pc:sldMk cId="1564045347" sldId="257"/>
-            <ac:spMk id="21" creationId="{E41EE540-2E01-FE4E-E457-FFB07F181EEC}"/>
-          </ac:spMkLst>
-        </pc:spChg>
-        <pc:spChg chg="del">
-          <ac:chgData name="Fatima Pillosu" userId="a6295d4dc9e22643" providerId="LiveId" clId="{87453732-75AC-4426-B5D3-B7C69C2D4F54}" dt="2026-02-03T17:13:47.568" v="0" actId="21"/>
-          <ac:spMkLst>
-            <pc:docMk/>
-            <pc:sldMk cId="1564045347" sldId="257"/>
-            <ac:spMk id="62" creationId="{CE6B8D1B-E5B6-A929-36D3-A1AB57DACA5A}"/>
-          </ac:spMkLst>
-        </pc:spChg>
-        <pc:spChg chg="del">
-          <ac:chgData name="Fatima Pillosu" userId="a6295d4dc9e22643" providerId="LiveId" clId="{87453732-75AC-4426-B5D3-B7C69C2D4F54}" dt="2026-02-03T17:13:47.568" v="0" actId="21"/>
-          <ac:spMkLst>
-            <pc:docMk/>
-            <pc:sldMk cId="1564045347" sldId="257"/>
-            <ac:spMk id="201" creationId="{A9489243-EC5F-4561-0480-CF1B0483A60D}"/>
-          </ac:spMkLst>
-        </pc:spChg>
         <pc:spChg chg="mod">
           <ac:chgData name="Fatima Pillosu" userId="a6295d4dc9e22643" providerId="LiveId" clId="{87453732-75AC-4426-B5D3-B7C69C2D4F54}" dt="2026-02-03T17:36:18.686" v="23" actId="207"/>
           <ac:spMkLst>
@@ -596,54 +524,6 @@
             <ac:spMk id="315" creationId="{0EEBD1D0-5D96-AB50-8217-811D1E099C2B}"/>
           </ac:spMkLst>
         </pc:spChg>
-        <pc:spChg chg="del">
-          <ac:chgData name="Fatima Pillosu" userId="a6295d4dc9e22643" providerId="LiveId" clId="{87453732-75AC-4426-B5D3-B7C69C2D4F54}" dt="2026-02-03T17:13:47.568" v="0" actId="21"/>
-          <ac:spMkLst>
-            <pc:docMk/>
-            <pc:sldMk cId="1564045347" sldId="257"/>
-            <ac:spMk id="319" creationId="{F818CBF6-D1F1-F81B-69C9-BBCAA6A97D45}"/>
-          </ac:spMkLst>
-        </pc:spChg>
-        <pc:spChg chg="del">
-          <ac:chgData name="Fatima Pillosu" userId="a6295d4dc9e22643" providerId="LiveId" clId="{87453732-75AC-4426-B5D3-B7C69C2D4F54}" dt="2026-02-03T17:13:47.568" v="0" actId="21"/>
-          <ac:spMkLst>
-            <pc:docMk/>
-            <pc:sldMk cId="1564045347" sldId="257"/>
-            <ac:spMk id="324" creationId="{B20CF3B4-062E-2B20-D8CC-0947363FE49F}"/>
-          </ac:spMkLst>
-        </pc:spChg>
-        <pc:spChg chg="del">
-          <ac:chgData name="Fatima Pillosu" userId="a6295d4dc9e22643" providerId="LiveId" clId="{87453732-75AC-4426-B5D3-B7C69C2D4F54}" dt="2026-02-03T17:13:47.568" v="0" actId="21"/>
-          <ac:spMkLst>
-            <pc:docMk/>
-            <pc:sldMk cId="1564045347" sldId="257"/>
-            <ac:spMk id="325" creationId="{676F5C26-663F-E6BB-FE9C-99AA181419C6}"/>
-          </ac:spMkLst>
-        </pc:spChg>
-        <pc:spChg chg="del">
-          <ac:chgData name="Fatima Pillosu" userId="a6295d4dc9e22643" providerId="LiveId" clId="{87453732-75AC-4426-B5D3-B7C69C2D4F54}" dt="2026-02-03T17:13:47.568" v="0" actId="21"/>
-          <ac:spMkLst>
-            <pc:docMk/>
-            <pc:sldMk cId="1564045347" sldId="257"/>
-            <ac:spMk id="331" creationId="{C331E31D-AA58-074F-8DB2-C07A80088ECD}"/>
-          </ac:spMkLst>
-        </pc:spChg>
-        <pc:spChg chg="del">
-          <ac:chgData name="Fatima Pillosu" userId="a6295d4dc9e22643" providerId="LiveId" clId="{87453732-75AC-4426-B5D3-B7C69C2D4F54}" dt="2026-02-03T17:13:47.568" v="0" actId="21"/>
-          <ac:spMkLst>
-            <pc:docMk/>
-            <pc:sldMk cId="1564045347" sldId="257"/>
-            <ac:spMk id="335" creationId="{591900DA-D706-1947-F6C7-19E81C533DE9}"/>
-          </ac:spMkLst>
-        </pc:spChg>
-        <pc:spChg chg="del">
-          <ac:chgData name="Fatima Pillosu" userId="a6295d4dc9e22643" providerId="LiveId" clId="{87453732-75AC-4426-B5D3-B7C69C2D4F54}" dt="2026-02-03T17:13:47.568" v="0" actId="21"/>
-          <ac:spMkLst>
-            <pc:docMk/>
-            <pc:sldMk cId="1564045347" sldId="257"/>
-            <ac:spMk id="337" creationId="{D410F8FC-FD7E-B965-43C0-C073BA38FDEA}"/>
-          </ac:spMkLst>
-        </pc:spChg>
       </pc:sldChg>
       <pc:sldChg chg="addSp delSp modSp new mod">
         <pc:chgData name="Fatima Pillosu" userId="a6295d4dc9e22643" providerId="LiveId" clId="{87453732-75AC-4426-B5D3-B7C69C2D4F54}" dt="2026-02-03T20:44:41.896" v="347" actId="478"/>
@@ -651,22 +531,6 @@
           <pc:docMk/>
           <pc:sldMk cId="3737545107" sldId="258"/>
         </pc:sldMkLst>
-        <pc:spChg chg="del">
-          <ac:chgData name="Fatima Pillosu" userId="a6295d4dc9e22643" providerId="LiveId" clId="{87453732-75AC-4426-B5D3-B7C69C2D4F54}" dt="2026-02-03T17:28:20.576" v="3" actId="478"/>
-          <ac:spMkLst>
-            <pc:docMk/>
-            <pc:sldMk cId="3737545107" sldId="258"/>
-            <ac:spMk id="2" creationId="{3211D4F6-1193-0DA3-1212-506D6D11A21B}"/>
-          </ac:spMkLst>
-        </pc:spChg>
-        <pc:spChg chg="del">
-          <ac:chgData name="Fatima Pillosu" userId="a6295d4dc9e22643" providerId="LiveId" clId="{87453732-75AC-4426-B5D3-B7C69C2D4F54}" dt="2026-02-03T17:28:21.445" v="4" actId="478"/>
-          <ac:spMkLst>
-            <pc:docMk/>
-            <pc:sldMk cId="3737545107" sldId="258"/>
-            <ac:spMk id="3" creationId="{067F5BD2-BDE0-0024-F7B6-00AFA7C7C57D}"/>
-          </ac:spMkLst>
-        </pc:spChg>
         <pc:spChg chg="add mod">
           <ac:chgData name="Fatima Pillosu" userId="a6295d4dc9e22643" providerId="LiveId" clId="{87453732-75AC-4426-B5D3-B7C69C2D4F54}" dt="2026-02-03T17:39:01.090" v="45" actId="1076"/>
           <ac:spMkLst>
@@ -681,14 +545,6 @@
             <pc:docMk/>
             <pc:sldMk cId="3737545107" sldId="258"/>
             <ac:spMk id="9" creationId="{4E4ACD13-75EA-6CCC-78EE-8D8A1A9D8C8E}"/>
-          </ac:spMkLst>
-        </pc:spChg>
-        <pc:spChg chg="add del mod">
-          <ac:chgData name="Fatima Pillosu" userId="a6295d4dc9e22643" providerId="LiveId" clId="{87453732-75AC-4426-B5D3-B7C69C2D4F54}" dt="2026-02-03T17:42:40.023" v="88" actId="478"/>
-          <ac:spMkLst>
-            <pc:docMk/>
-            <pc:sldMk cId="3737545107" sldId="258"/>
-            <ac:spMk id="13" creationId="{E7FD3B64-21F1-8204-2077-5157BC234D94}"/>
           </ac:spMkLst>
         </pc:spChg>
         <pc:spChg chg="add mod ord">
@@ -795,30 +651,6 @@
             <ac:spMk id="30" creationId="{545AB285-8EBC-FE05-AAD9-83C6EAD202C0}"/>
           </ac:spMkLst>
         </pc:spChg>
-        <pc:picChg chg="add del mod">
-          <ac:chgData name="Fatima Pillosu" userId="a6295d4dc9e22643" providerId="LiveId" clId="{87453732-75AC-4426-B5D3-B7C69C2D4F54}" dt="2026-02-03T17:37:53.552" v="34" actId="478"/>
-          <ac:picMkLst>
-            <pc:docMk/>
-            <pc:sldMk cId="3737545107" sldId="258"/>
-            <ac:picMk id="4" creationId="{8D29F00D-3DC2-C507-1A43-36FF0B69B010}"/>
-          </ac:picMkLst>
-        </pc:picChg>
-        <pc:picChg chg="add del mod">
-          <ac:chgData name="Fatima Pillosu" userId="a6295d4dc9e22643" providerId="LiveId" clId="{87453732-75AC-4426-B5D3-B7C69C2D4F54}" dt="2026-02-03T17:38:42.913" v="43" actId="478"/>
-          <ac:picMkLst>
-            <pc:docMk/>
-            <pc:sldMk cId="3737545107" sldId="258"/>
-            <ac:picMk id="16" creationId="{64900D19-B833-9C77-FED0-2899F3E9FBDD}"/>
-          </ac:picMkLst>
-        </pc:picChg>
-        <pc:picChg chg="add del mod">
-          <ac:chgData name="Fatima Pillosu" userId="a6295d4dc9e22643" providerId="LiveId" clId="{87453732-75AC-4426-B5D3-B7C69C2D4F54}" dt="2026-02-03T20:44:41.896" v="347" actId="478"/>
-          <ac:picMkLst>
-            <pc:docMk/>
-            <pc:sldMk cId="3737545107" sldId="258"/>
-            <ac:picMk id="18" creationId="{9BC47136-3516-FEFB-109C-2FC4FDE8EB21}"/>
-          </ac:picMkLst>
-        </pc:picChg>
         <pc:picChg chg="add mod ord">
           <ac:chgData name="Fatima Pillosu" userId="a6295d4dc9e22643" providerId="LiveId" clId="{87453732-75AC-4426-B5D3-B7C69C2D4F54}" dt="2026-02-03T20:44:37.883" v="346" actId="167"/>
           <ac:picMkLst>
@@ -898,38 +730,6 @@
             <ac:spMk id="2" creationId="{53C4E5DA-48E2-2E3F-E285-388C08B6FDC3}"/>
           </ac:spMkLst>
         </pc:spChg>
-        <pc:spChg chg="del">
-          <ac:chgData name="Fatima Pillosu" userId="a6295d4dc9e22643" providerId="LiveId" clId="{87453732-75AC-4426-B5D3-B7C69C2D4F54}" dt="2026-02-03T17:39:14.778" v="47" actId="478"/>
-          <ac:spMkLst>
-            <pc:docMk/>
-            <pc:sldMk cId="3420742301" sldId="259"/>
-            <ac:spMk id="8" creationId="{1184F004-544E-B28B-DFC4-F1EC6E34453E}"/>
-          </ac:spMkLst>
-        </pc:spChg>
-        <pc:spChg chg="del">
-          <ac:chgData name="Fatima Pillosu" userId="a6295d4dc9e22643" providerId="LiveId" clId="{87453732-75AC-4426-B5D3-B7C69C2D4F54}" dt="2026-02-03T17:39:14.778" v="47" actId="478"/>
-          <ac:spMkLst>
-            <pc:docMk/>
-            <pc:sldMk cId="3420742301" sldId="259"/>
-            <ac:spMk id="9" creationId="{ADE3F67B-2B05-EBF3-CEFD-CF84277A74B1}"/>
-          </ac:spMkLst>
-        </pc:spChg>
-        <pc:spChg chg="del">
-          <ac:chgData name="Fatima Pillosu" userId="a6295d4dc9e22643" providerId="LiveId" clId="{87453732-75AC-4426-B5D3-B7C69C2D4F54}" dt="2026-02-03T17:39:14.778" v="47" actId="478"/>
-          <ac:spMkLst>
-            <pc:docMk/>
-            <pc:sldMk cId="3420742301" sldId="259"/>
-            <ac:spMk id="13" creationId="{63D556A8-6897-8642-0344-9421FDFA3C58}"/>
-          </ac:spMkLst>
-        </pc:spChg>
-        <pc:spChg chg="del">
-          <ac:chgData name="Fatima Pillosu" userId="a6295d4dc9e22643" providerId="LiveId" clId="{87453732-75AC-4426-B5D3-B7C69C2D4F54}" dt="2026-02-03T17:39:14.778" v="47" actId="478"/>
-          <ac:spMkLst>
-            <pc:docMk/>
-            <pc:sldMk cId="3420742301" sldId="259"/>
-            <ac:spMk id="15" creationId="{8DB3F7F5-EBFB-21AE-E855-78C797509158}"/>
-          </ac:spMkLst>
-        </pc:spChg>
         <pc:spChg chg="add mod">
           <ac:chgData name="Fatima Pillosu" userId="a6295d4dc9e22643" providerId="LiveId" clId="{87453732-75AC-4426-B5D3-B7C69C2D4F54}" dt="2026-02-03T20:45:20.651" v="351" actId="208"/>
           <ac:spMkLst>
@@ -952,118 +752,6 @@
             <pc:docMk/>
             <pc:sldMk cId="3420742301" sldId="259"/>
             <ac:spMk id="23" creationId="{E9E53F9E-B2AD-5D40-8480-889A3561478D}"/>
-          </ac:spMkLst>
-        </pc:spChg>
-        <pc:spChg chg="add del mod">
-          <ac:chgData name="Fatima Pillosu" userId="a6295d4dc9e22643" providerId="LiveId" clId="{87453732-75AC-4426-B5D3-B7C69C2D4F54}" dt="2026-02-03T17:39:34.609" v="51" actId="478"/>
-          <ac:spMkLst>
-            <pc:docMk/>
-            <pc:sldMk cId="3420742301" sldId="259"/>
-            <ac:spMk id="24" creationId="{EDA793BB-B5ED-3608-7F29-8C49B41196C9}"/>
-          </ac:spMkLst>
-        </pc:spChg>
-        <pc:spChg chg="add del mod">
-          <ac:chgData name="Fatima Pillosu" userId="a6295d4dc9e22643" providerId="LiveId" clId="{87453732-75AC-4426-B5D3-B7C69C2D4F54}" dt="2026-02-03T17:39:37.250" v="52" actId="478"/>
-          <ac:spMkLst>
-            <pc:docMk/>
-            <pc:sldMk cId="3420742301" sldId="259"/>
-            <ac:spMk id="25" creationId="{0A745384-2768-92C6-6E00-93A1A8FAAB87}"/>
-          </ac:spMkLst>
-        </pc:spChg>
-        <pc:spChg chg="del">
-          <ac:chgData name="Fatima Pillosu" userId="a6295d4dc9e22643" providerId="LiveId" clId="{87453732-75AC-4426-B5D3-B7C69C2D4F54}" dt="2026-02-03T17:39:37.250" v="52" actId="478"/>
-          <ac:spMkLst>
-            <pc:docMk/>
-            <pc:sldMk cId="3420742301" sldId="259"/>
-            <ac:spMk id="26" creationId="{635EFFF8-6C24-ABD4-1E38-F1B2207D1454}"/>
-          </ac:spMkLst>
-        </pc:spChg>
-        <pc:spChg chg="del">
-          <ac:chgData name="Fatima Pillosu" userId="a6295d4dc9e22643" providerId="LiveId" clId="{87453732-75AC-4426-B5D3-B7C69C2D4F54}" dt="2026-02-03T17:39:37.250" v="52" actId="478"/>
-          <ac:spMkLst>
-            <pc:docMk/>
-            <pc:sldMk cId="3420742301" sldId="259"/>
-            <ac:spMk id="27" creationId="{0EB9C530-B030-4B34-7500-CE213DAF50C7}"/>
-          </ac:spMkLst>
-        </pc:spChg>
-        <pc:spChg chg="del">
-          <ac:chgData name="Fatima Pillosu" userId="a6295d4dc9e22643" providerId="LiveId" clId="{87453732-75AC-4426-B5D3-B7C69C2D4F54}" dt="2026-02-03T17:39:38.824" v="53" actId="478"/>
-          <ac:spMkLst>
-            <pc:docMk/>
-            <pc:sldMk cId="3420742301" sldId="259"/>
-            <ac:spMk id="28" creationId="{BD89E167-EB80-0EF1-1555-F26FFA618470}"/>
-          </ac:spMkLst>
-        </pc:spChg>
-        <pc:spChg chg="del">
-          <ac:chgData name="Fatima Pillosu" userId="a6295d4dc9e22643" providerId="LiveId" clId="{87453732-75AC-4426-B5D3-B7C69C2D4F54}" dt="2026-02-03T17:39:34.609" v="51" actId="478"/>
-          <ac:spMkLst>
-            <pc:docMk/>
-            <pc:sldMk cId="3420742301" sldId="259"/>
-            <ac:spMk id="29" creationId="{0E940E86-0D1F-C647-B71C-E171D94E27CD}"/>
-          </ac:spMkLst>
-        </pc:spChg>
-        <pc:spChg chg="add del mod">
-          <ac:chgData name="Fatima Pillosu" userId="a6295d4dc9e22643" providerId="LiveId" clId="{87453732-75AC-4426-B5D3-B7C69C2D4F54}" dt="2026-02-03T17:39:34.609" v="51" actId="478"/>
-          <ac:spMkLst>
-            <pc:docMk/>
-            <pc:sldMk cId="3420742301" sldId="259"/>
-            <ac:spMk id="30" creationId="{F40A1F50-8E90-D1ED-E5B5-30D2B169915F}"/>
-          </ac:spMkLst>
-        </pc:spChg>
-        <pc:spChg chg="del">
-          <ac:chgData name="Fatima Pillosu" userId="a6295d4dc9e22643" providerId="LiveId" clId="{87453732-75AC-4426-B5D3-B7C69C2D4F54}" dt="2026-02-03T17:39:34.609" v="51" actId="478"/>
-          <ac:spMkLst>
-            <pc:docMk/>
-            <pc:sldMk cId="3420742301" sldId="259"/>
-            <ac:spMk id="31" creationId="{66B53714-F142-728D-94F7-D3003CF85658}"/>
-          </ac:spMkLst>
-        </pc:spChg>
-        <pc:spChg chg="add del mod">
-          <ac:chgData name="Fatima Pillosu" userId="a6295d4dc9e22643" providerId="LiveId" clId="{87453732-75AC-4426-B5D3-B7C69C2D4F54}" dt="2026-02-03T17:39:34.609" v="51" actId="478"/>
-          <ac:spMkLst>
-            <pc:docMk/>
-            <pc:sldMk cId="3420742301" sldId="259"/>
-            <ac:spMk id="32" creationId="{EEA09F1C-EEA0-48C5-7FD2-08A99CB9C19D}"/>
-          </ac:spMkLst>
-        </pc:spChg>
-        <pc:spChg chg="del">
-          <ac:chgData name="Fatima Pillosu" userId="a6295d4dc9e22643" providerId="LiveId" clId="{87453732-75AC-4426-B5D3-B7C69C2D4F54}" dt="2026-02-03T17:39:34.609" v="51" actId="478"/>
-          <ac:spMkLst>
-            <pc:docMk/>
-            <pc:sldMk cId="3420742301" sldId="259"/>
-            <ac:spMk id="33" creationId="{4F250F97-46FB-5088-7A59-C4435E57209B}"/>
-          </ac:spMkLst>
-        </pc:spChg>
-        <pc:spChg chg="add del mod">
-          <ac:chgData name="Fatima Pillosu" userId="a6295d4dc9e22643" providerId="LiveId" clId="{87453732-75AC-4426-B5D3-B7C69C2D4F54}" dt="2026-02-03T17:39:34.609" v="51" actId="478"/>
-          <ac:spMkLst>
-            <pc:docMk/>
-            <pc:sldMk cId="3420742301" sldId="259"/>
-            <ac:spMk id="34" creationId="{173EFCBF-415B-CFA9-8013-E8D14D1B74D2}"/>
-          </ac:spMkLst>
-        </pc:spChg>
-        <pc:spChg chg="del">
-          <ac:chgData name="Fatima Pillosu" userId="a6295d4dc9e22643" providerId="LiveId" clId="{87453732-75AC-4426-B5D3-B7C69C2D4F54}" dt="2026-02-03T17:39:34.609" v="51" actId="478"/>
-          <ac:spMkLst>
-            <pc:docMk/>
-            <pc:sldMk cId="3420742301" sldId="259"/>
-            <ac:spMk id="35" creationId="{6CC6D4DE-C39B-107F-AAD3-9DA5ADE7FF8E}"/>
-          </ac:spMkLst>
-        </pc:spChg>
-        <pc:spChg chg="add del mod">
-          <ac:chgData name="Fatima Pillosu" userId="a6295d4dc9e22643" providerId="LiveId" clId="{87453732-75AC-4426-B5D3-B7C69C2D4F54}" dt="2026-02-03T17:39:32.181" v="50" actId="478"/>
-          <ac:spMkLst>
-            <pc:docMk/>
-            <pc:sldMk cId="3420742301" sldId="259"/>
-            <ac:spMk id="36" creationId="{02F3B890-6006-7026-BB29-669C3009A42B}"/>
-          </ac:spMkLst>
-        </pc:spChg>
-        <pc:spChg chg="add del mod">
-          <ac:chgData name="Fatima Pillosu" userId="a6295d4dc9e22643" providerId="LiveId" clId="{87453732-75AC-4426-B5D3-B7C69C2D4F54}" dt="2026-02-03T17:42:05.913" v="82" actId="478"/>
-          <ac:spMkLst>
-            <pc:docMk/>
-            <pc:sldMk cId="3420742301" sldId="259"/>
-            <ac:spMk id="37" creationId="{EB1D8D87-FB44-9697-63B7-9BE1D8DF2C53}"/>
           </ac:spMkLst>
         </pc:spChg>
         <pc:spChg chg="add mod">
@@ -1098,14 +786,6 @@
             <ac:spMk id="42" creationId="{1F63C331-F946-2881-D425-0D767C1358C1}"/>
           </ac:spMkLst>
         </pc:spChg>
-        <pc:spChg chg="add del mod">
-          <ac:chgData name="Fatima Pillosu" userId="a6295d4dc9e22643" providerId="LiveId" clId="{87453732-75AC-4426-B5D3-B7C69C2D4F54}" dt="2026-02-03T20:42:29.133" v="307" actId="478"/>
-          <ac:spMkLst>
-            <pc:docMk/>
-            <pc:sldMk cId="3420742301" sldId="259"/>
-            <ac:spMk id="43" creationId="{D7F9A3DA-1757-7D5B-536E-8D6DF1A2DF76}"/>
-          </ac:spMkLst>
-        </pc:spChg>
         <pc:spChg chg="add mod">
           <ac:chgData name="Fatima Pillosu" userId="a6295d4dc9e22643" providerId="LiveId" clId="{87453732-75AC-4426-B5D3-B7C69C2D4F54}" dt="2026-02-03T20:48:00.347" v="673" actId="207"/>
           <ac:spMkLst>
@@ -1120,14 +800,6 @@
             <pc:docMk/>
             <pc:sldMk cId="3420742301" sldId="259"/>
             <ac:spMk id="45" creationId="{71F97612-C485-AE23-BD9F-7CA352F3DB7C}"/>
-          </ac:spMkLst>
-        </pc:spChg>
-        <pc:spChg chg="add del mod">
-          <ac:chgData name="Fatima Pillosu" userId="a6295d4dc9e22643" providerId="LiveId" clId="{87453732-75AC-4426-B5D3-B7C69C2D4F54}" dt="2026-02-03T20:46:59.676" v="379" actId="478"/>
-          <ac:spMkLst>
-            <pc:docMk/>
-            <pc:sldMk cId="3420742301" sldId="259"/>
-            <ac:spMk id="47" creationId="{8911CC50-BFD5-C55F-44C0-D8EF0022D2B4}"/>
           </ac:spMkLst>
         </pc:spChg>
         <pc:spChg chg="add mod">
@@ -1187,14 +859,6 @@
           </ac:spMkLst>
         </pc:spChg>
         <pc:picChg chg="add del mod ord">
-          <ac:chgData name="Fatima Pillosu" userId="a6295d4dc9e22643" providerId="LiveId" clId="{87453732-75AC-4426-B5D3-B7C69C2D4F54}" dt="2026-02-03T20:46:07.523" v="367" actId="478"/>
-          <ac:picMkLst>
-            <pc:docMk/>
-            <pc:sldMk cId="3420742301" sldId="259"/>
-            <ac:picMk id="38" creationId="{899C9352-C1EA-225E-0FC5-9E6F5B3750E1}"/>
-          </ac:picMkLst>
-        </pc:picChg>
-        <pc:picChg chg="add del mod ord">
           <ac:chgData name="Fatima Pillosu" userId="a6295d4dc9e22643" providerId="LiveId" clId="{87453732-75AC-4426-B5D3-B7C69C2D4F54}" dt="2026-02-03T20:45:56.752" v="362" actId="167"/>
           <ac:picMkLst>
             <pc:docMk/>
@@ -1216,54 +880,6 @@
             <pc:docMk/>
             <pc:sldMk cId="3420742301" sldId="259"/>
             <ac:cxnSpMk id="4" creationId="{690415C6-F4F3-961F-D10D-1ADA3AA4F0FE}"/>
-          </ac:cxnSpMkLst>
-        </pc:cxnChg>
-        <pc:cxnChg chg="del">
-          <ac:chgData name="Fatima Pillosu" userId="a6295d4dc9e22643" providerId="LiveId" clId="{87453732-75AC-4426-B5D3-B7C69C2D4F54}" dt="2026-02-03T17:39:14.778" v="47" actId="478"/>
-          <ac:cxnSpMkLst>
-            <pc:docMk/>
-            <pc:sldMk cId="3420742301" sldId="259"/>
-            <ac:cxnSpMk id="5" creationId="{EFA2AC8C-7FFC-17D1-3910-6FBAC2CC93A5}"/>
-          </ac:cxnSpMkLst>
-        </pc:cxnChg>
-        <pc:cxnChg chg="del">
-          <ac:chgData name="Fatima Pillosu" userId="a6295d4dc9e22643" providerId="LiveId" clId="{87453732-75AC-4426-B5D3-B7C69C2D4F54}" dt="2026-02-03T17:39:14.778" v="47" actId="478"/>
-          <ac:cxnSpMkLst>
-            <pc:docMk/>
-            <pc:sldMk cId="3420742301" sldId="259"/>
-            <ac:cxnSpMk id="6" creationId="{BF894703-1CA2-C30C-F857-05970ED85EF9}"/>
-          </ac:cxnSpMkLst>
-        </pc:cxnChg>
-        <pc:cxnChg chg="del">
-          <ac:chgData name="Fatima Pillosu" userId="a6295d4dc9e22643" providerId="LiveId" clId="{87453732-75AC-4426-B5D3-B7C69C2D4F54}" dt="2026-02-03T17:39:14.778" v="47" actId="478"/>
-          <ac:cxnSpMkLst>
-            <pc:docMk/>
-            <pc:sldMk cId="3420742301" sldId="259"/>
-            <ac:cxnSpMk id="7" creationId="{F676E47D-2C8D-3BBA-4C8C-07D396148814}"/>
-          </ac:cxnSpMkLst>
-        </pc:cxnChg>
-        <pc:cxnChg chg="del">
-          <ac:chgData name="Fatima Pillosu" userId="a6295d4dc9e22643" providerId="LiveId" clId="{87453732-75AC-4426-B5D3-B7C69C2D4F54}" dt="2026-02-03T17:39:14.778" v="47" actId="478"/>
-          <ac:cxnSpMkLst>
-            <pc:docMk/>
-            <pc:sldMk cId="3420742301" sldId="259"/>
-            <ac:cxnSpMk id="10" creationId="{AA08EB68-5937-CC96-EB62-B50B42D0C642}"/>
-          </ac:cxnSpMkLst>
-        </pc:cxnChg>
-        <pc:cxnChg chg="del">
-          <ac:chgData name="Fatima Pillosu" userId="a6295d4dc9e22643" providerId="LiveId" clId="{87453732-75AC-4426-B5D3-B7C69C2D4F54}" dt="2026-02-03T17:39:14.778" v="47" actId="478"/>
-          <ac:cxnSpMkLst>
-            <pc:docMk/>
-            <pc:sldMk cId="3420742301" sldId="259"/>
-            <ac:cxnSpMk id="12" creationId="{67B3B5EE-FDE9-E1F1-10FE-EB7FCB4AD035}"/>
-          </ac:cxnSpMkLst>
-        </pc:cxnChg>
-        <pc:cxnChg chg="del">
-          <ac:chgData name="Fatima Pillosu" userId="a6295d4dc9e22643" providerId="LiveId" clId="{87453732-75AC-4426-B5D3-B7C69C2D4F54}" dt="2026-02-03T17:39:14.778" v="47" actId="478"/>
-          <ac:cxnSpMkLst>
-            <pc:docMk/>
-            <pc:sldMk cId="3420742301" sldId="259"/>
-            <ac:cxnSpMk id="14" creationId="{A15088B3-568E-FA14-E5F6-2BD1CEB6D018}"/>
           </ac:cxnSpMkLst>
         </pc:cxnChg>
         <pc:cxnChg chg="mod">
@@ -1313,14 +929,6 @@
           <pc:docMk/>
           <pc:sldMk cId="1109040034" sldId="260"/>
         </pc:sldMkLst>
-        <pc:spChg chg="del">
-          <ac:chgData name="Fatima Pillosu" userId="a6295d4dc9e22643" providerId="LiveId" clId="{87453732-75AC-4426-B5D3-B7C69C2D4F54}" dt="2026-02-03T17:40:51.189" v="61" actId="478"/>
-          <ac:spMkLst>
-            <pc:docMk/>
-            <pc:sldMk cId="1109040034" sldId="260"/>
-            <ac:spMk id="2" creationId="{8ED43FCA-F16B-1AD5-1244-BB09FEA362E9}"/>
-          </ac:spMkLst>
-        </pc:spChg>
         <pc:spChg chg="mod">
           <ac:chgData name="Fatima Pillosu" userId="a6295d4dc9e22643" providerId="LiveId" clId="{87453732-75AC-4426-B5D3-B7C69C2D4F54}" dt="2026-02-03T20:49:12.830" v="681" actId="1076"/>
           <ac:spMkLst>
@@ -1351,166 +959,6 @@
             <pc:docMk/>
             <pc:sldMk cId="1109040034" sldId="260"/>
             <ac:spMk id="15" creationId="{2B57DC69-D20E-412D-46BF-D3F4CAABE93B}"/>
-          </ac:spMkLst>
-        </pc:spChg>
-        <pc:spChg chg="del">
-          <ac:chgData name="Fatima Pillosu" userId="a6295d4dc9e22643" providerId="LiveId" clId="{87453732-75AC-4426-B5D3-B7C69C2D4F54}" dt="2026-02-03T17:40:51.189" v="61" actId="478"/>
-          <ac:spMkLst>
-            <pc:docMk/>
-            <pc:sldMk cId="1109040034" sldId="260"/>
-            <ac:spMk id="21" creationId="{F0108896-A0ED-DAE9-E3A3-0FED1AC8A996}"/>
-          </ac:spMkLst>
-        </pc:spChg>
-        <pc:spChg chg="del">
-          <ac:chgData name="Fatima Pillosu" userId="a6295d4dc9e22643" providerId="LiveId" clId="{87453732-75AC-4426-B5D3-B7C69C2D4F54}" dt="2026-02-03T17:40:51.189" v="61" actId="478"/>
-          <ac:spMkLst>
-            <pc:docMk/>
-            <pc:sldMk cId="1109040034" sldId="260"/>
-            <ac:spMk id="22" creationId="{CA80CB98-1897-15F9-E548-69F74EE5522E}"/>
-          </ac:spMkLst>
-        </pc:spChg>
-        <pc:spChg chg="del">
-          <ac:chgData name="Fatima Pillosu" userId="a6295d4dc9e22643" providerId="LiveId" clId="{87453732-75AC-4426-B5D3-B7C69C2D4F54}" dt="2026-02-03T17:40:51.189" v="61" actId="478"/>
-          <ac:spMkLst>
-            <pc:docMk/>
-            <pc:sldMk cId="1109040034" sldId="260"/>
-            <ac:spMk id="23" creationId="{8F2A839E-56D0-0AA3-9F80-DBEF00E3C42E}"/>
-          </ac:spMkLst>
-        </pc:spChg>
-        <pc:spChg chg="add del mod">
-          <ac:chgData name="Fatima Pillosu" userId="a6295d4dc9e22643" providerId="LiveId" clId="{87453732-75AC-4426-B5D3-B7C69C2D4F54}" dt="2026-02-03T17:41:07.882" v="67" actId="478"/>
-          <ac:spMkLst>
-            <pc:docMk/>
-            <pc:sldMk cId="1109040034" sldId="260"/>
-            <ac:spMk id="24" creationId="{39178F38-D2D6-DDC6-9CE7-DA586B456A04}"/>
-          </ac:spMkLst>
-        </pc:spChg>
-        <pc:spChg chg="del">
-          <ac:chgData name="Fatima Pillosu" userId="a6295d4dc9e22643" providerId="LiveId" clId="{87453732-75AC-4426-B5D3-B7C69C2D4F54}" dt="2026-02-03T17:41:07.882" v="67" actId="478"/>
-          <ac:spMkLst>
-            <pc:docMk/>
-            <pc:sldMk cId="1109040034" sldId="260"/>
-            <ac:spMk id="25" creationId="{F3BE33B5-23F1-F859-26A7-BE88CB588B58}"/>
-          </ac:spMkLst>
-        </pc:spChg>
-        <pc:spChg chg="add del mod">
-          <ac:chgData name="Fatima Pillosu" userId="a6295d4dc9e22643" providerId="LiveId" clId="{87453732-75AC-4426-B5D3-B7C69C2D4F54}" dt="2026-02-03T17:41:07.882" v="67" actId="478"/>
-          <ac:spMkLst>
-            <pc:docMk/>
-            <pc:sldMk cId="1109040034" sldId="260"/>
-            <ac:spMk id="26" creationId="{73FB3AF6-2F40-DC2B-AAF0-DA7149DA9000}"/>
-          </ac:spMkLst>
-        </pc:spChg>
-        <pc:spChg chg="add del mod">
-          <ac:chgData name="Fatima Pillosu" userId="a6295d4dc9e22643" providerId="LiveId" clId="{87453732-75AC-4426-B5D3-B7C69C2D4F54}" dt="2026-02-03T17:41:07.882" v="67" actId="478"/>
-          <ac:spMkLst>
-            <pc:docMk/>
-            <pc:sldMk cId="1109040034" sldId="260"/>
-            <ac:spMk id="27" creationId="{906CFD25-13D4-4DEB-E32D-5B07FE67EE05}"/>
-          </ac:spMkLst>
-        </pc:spChg>
-        <pc:spChg chg="del">
-          <ac:chgData name="Fatima Pillosu" userId="a6295d4dc9e22643" providerId="LiveId" clId="{87453732-75AC-4426-B5D3-B7C69C2D4F54}" dt="2026-02-03T17:41:07.882" v="67" actId="478"/>
-          <ac:spMkLst>
-            <pc:docMk/>
-            <pc:sldMk cId="1109040034" sldId="260"/>
-            <ac:spMk id="28" creationId="{CF850366-E1B9-4E4A-5F36-50CF1C4CBF2A}"/>
-          </ac:spMkLst>
-        </pc:spChg>
-        <pc:spChg chg="add del mod">
-          <ac:chgData name="Fatima Pillosu" userId="a6295d4dc9e22643" providerId="LiveId" clId="{87453732-75AC-4426-B5D3-B7C69C2D4F54}" dt="2026-02-03T17:41:07.882" v="67" actId="478"/>
-          <ac:spMkLst>
-            <pc:docMk/>
-            <pc:sldMk cId="1109040034" sldId="260"/>
-            <ac:spMk id="29" creationId="{1739EBBD-AA12-6589-4C47-441E7E5E1CB9}"/>
-          </ac:spMkLst>
-        </pc:spChg>
-        <pc:spChg chg="add del mod">
-          <ac:chgData name="Fatima Pillosu" userId="a6295d4dc9e22643" providerId="LiveId" clId="{87453732-75AC-4426-B5D3-B7C69C2D4F54}" dt="2026-02-03T17:41:09.791" v="68" actId="478"/>
-          <ac:spMkLst>
-            <pc:docMk/>
-            <pc:sldMk cId="1109040034" sldId="260"/>
-            <ac:spMk id="30" creationId="{88B3957C-4F7F-1BE5-42B2-1DD756EF2046}"/>
-          </ac:spMkLst>
-        </pc:spChg>
-        <pc:spChg chg="add del mod">
-          <ac:chgData name="Fatima Pillosu" userId="a6295d4dc9e22643" providerId="LiveId" clId="{87453732-75AC-4426-B5D3-B7C69C2D4F54}" dt="2026-02-03T17:41:09.791" v="68" actId="478"/>
-          <ac:spMkLst>
-            <pc:docMk/>
-            <pc:sldMk cId="1109040034" sldId="260"/>
-            <ac:spMk id="31" creationId="{284B9F4F-C87D-6098-BA67-2A518625CD85}"/>
-          </ac:spMkLst>
-        </pc:spChg>
-        <pc:spChg chg="del">
-          <ac:chgData name="Fatima Pillosu" userId="a6295d4dc9e22643" providerId="LiveId" clId="{87453732-75AC-4426-B5D3-B7C69C2D4F54}" dt="2026-02-03T17:41:09.791" v="68" actId="478"/>
-          <ac:spMkLst>
-            <pc:docMk/>
-            <pc:sldMk cId="1109040034" sldId="260"/>
-            <ac:spMk id="32" creationId="{8A43F71E-5B9F-7EF2-9A1B-E1E0775AE6AB}"/>
-          </ac:spMkLst>
-        </pc:spChg>
-        <pc:spChg chg="del">
-          <ac:chgData name="Fatima Pillosu" userId="a6295d4dc9e22643" providerId="LiveId" clId="{87453732-75AC-4426-B5D3-B7C69C2D4F54}" dt="2026-02-03T17:41:09.791" v="68" actId="478"/>
-          <ac:spMkLst>
-            <pc:docMk/>
-            <pc:sldMk cId="1109040034" sldId="260"/>
-            <ac:spMk id="33" creationId="{1AEC2736-2856-CE79-1C41-A1BB6B04A6EA}"/>
-          </ac:spMkLst>
-        </pc:spChg>
-        <pc:spChg chg="del">
-          <ac:chgData name="Fatima Pillosu" userId="a6295d4dc9e22643" providerId="LiveId" clId="{87453732-75AC-4426-B5D3-B7C69C2D4F54}" dt="2026-02-03T17:41:09.791" v="68" actId="478"/>
-          <ac:spMkLst>
-            <pc:docMk/>
-            <pc:sldMk cId="1109040034" sldId="260"/>
-            <ac:spMk id="34" creationId="{4B611716-25D3-DADD-3A03-C19149FBC236}"/>
-          </ac:spMkLst>
-        </pc:spChg>
-        <pc:spChg chg="add del mod">
-          <ac:chgData name="Fatima Pillosu" userId="a6295d4dc9e22643" providerId="LiveId" clId="{87453732-75AC-4426-B5D3-B7C69C2D4F54}" dt="2026-02-03T17:41:09.791" v="68" actId="478"/>
-          <ac:spMkLst>
-            <pc:docMk/>
-            <pc:sldMk cId="1109040034" sldId="260"/>
-            <ac:spMk id="35" creationId="{40388435-3BCB-8DD4-EB3F-AE84A79BF9C6}"/>
-          </ac:spMkLst>
-        </pc:spChg>
-        <pc:spChg chg="del">
-          <ac:chgData name="Fatima Pillosu" userId="a6295d4dc9e22643" providerId="LiveId" clId="{87453732-75AC-4426-B5D3-B7C69C2D4F54}" dt="2026-02-03T17:41:09.791" v="68" actId="478"/>
-          <ac:spMkLst>
-            <pc:docMk/>
-            <pc:sldMk cId="1109040034" sldId="260"/>
-            <ac:spMk id="36" creationId="{EF1D5643-ACE7-63B9-31EA-0B34D33A4D7A}"/>
-          </ac:spMkLst>
-        </pc:spChg>
-        <pc:spChg chg="del">
-          <ac:chgData name="Fatima Pillosu" userId="a6295d4dc9e22643" providerId="LiveId" clId="{87453732-75AC-4426-B5D3-B7C69C2D4F54}" dt="2026-02-03T17:40:51.189" v="61" actId="478"/>
-          <ac:spMkLst>
-            <pc:docMk/>
-            <pc:sldMk cId="1109040034" sldId="260"/>
-            <ac:spMk id="37" creationId="{07DD9AB7-E841-6307-8CAB-C287581D3F25}"/>
-          </ac:spMkLst>
-        </pc:spChg>
-        <pc:spChg chg="del">
-          <ac:chgData name="Fatima Pillosu" userId="a6295d4dc9e22643" providerId="LiveId" clId="{87453732-75AC-4426-B5D3-B7C69C2D4F54}" dt="2026-02-03T17:41:05.113" v="66" actId="478"/>
-          <ac:spMkLst>
-            <pc:docMk/>
-            <pc:sldMk cId="1109040034" sldId="260"/>
-            <ac:spMk id="38" creationId="{5F64932E-2BC1-8F5A-8F9C-19485DB757D1}"/>
-          </ac:spMkLst>
-        </pc:spChg>
-        <pc:spChg chg="add del mod">
-          <ac:chgData name="Fatima Pillosu" userId="a6295d4dc9e22643" providerId="LiveId" clId="{87453732-75AC-4426-B5D3-B7C69C2D4F54}" dt="2026-02-03T17:41:11.035" v="69" actId="478"/>
-          <ac:spMkLst>
-            <pc:docMk/>
-            <pc:sldMk cId="1109040034" sldId="260"/>
-            <ac:spMk id="39" creationId="{A809C241-BC38-5F86-20BD-74F534B8E6B1}"/>
-          </ac:spMkLst>
-        </pc:spChg>
-        <pc:spChg chg="add del mod">
-          <ac:chgData name="Fatima Pillosu" userId="a6295d4dc9e22643" providerId="LiveId" clId="{87453732-75AC-4426-B5D3-B7C69C2D4F54}" dt="2026-02-03T17:42:03.034" v="81" actId="478"/>
-          <ac:spMkLst>
-            <pc:docMk/>
-            <pc:sldMk cId="1109040034" sldId="260"/>
-            <ac:spMk id="47" creationId="{BE86B7A8-1B25-AFA5-1D21-DD39A733E1CE}"/>
           </ac:spMkLst>
         </pc:spChg>
         <pc:spChg chg="add mod">
@@ -1601,30 +1049,6 @@
             <ac:picMk id="48" creationId="{C56B5021-059E-0B70-0297-317EE03BE444}"/>
           </ac:picMkLst>
         </pc:picChg>
-        <pc:picChg chg="del ord">
-          <ac:chgData name="Fatima Pillosu" userId="a6295d4dc9e22643" providerId="LiveId" clId="{87453732-75AC-4426-B5D3-B7C69C2D4F54}" dt="2026-02-03T20:49:49.647" v="692" actId="478"/>
-          <ac:picMkLst>
-            <pc:docMk/>
-            <pc:sldMk cId="1109040034" sldId="260"/>
-            <ac:picMk id="49" creationId="{C3DA5A68-A082-D13C-D150-1CBFD14E8FA7}"/>
-          </ac:picMkLst>
-        </pc:picChg>
-        <pc:cxnChg chg="del">
-          <ac:chgData name="Fatima Pillosu" userId="a6295d4dc9e22643" providerId="LiveId" clId="{87453732-75AC-4426-B5D3-B7C69C2D4F54}" dt="2026-02-03T17:40:51.189" v="61" actId="478"/>
-          <ac:cxnSpMkLst>
-            <pc:docMk/>
-            <pc:sldMk cId="1109040034" sldId="260"/>
-            <ac:cxnSpMk id="3" creationId="{180AC6B2-FE1A-0735-82BB-24050ECFB29A}"/>
-          </ac:cxnSpMkLst>
-        </pc:cxnChg>
-        <pc:cxnChg chg="del">
-          <ac:chgData name="Fatima Pillosu" userId="a6295d4dc9e22643" providerId="LiveId" clId="{87453732-75AC-4426-B5D3-B7C69C2D4F54}" dt="2026-02-03T17:40:51.189" v="61" actId="478"/>
-          <ac:cxnSpMkLst>
-            <pc:docMk/>
-            <pc:sldMk cId="1109040034" sldId="260"/>
-            <ac:cxnSpMk id="4" creationId="{38B053A1-E3D0-B99F-A6C4-460C4048B83E}"/>
-          </ac:cxnSpMkLst>
-        </pc:cxnChg>
         <pc:cxnChg chg="mod">
           <ac:chgData name="Fatima Pillosu" userId="a6295d4dc9e22643" providerId="LiveId" clId="{87453732-75AC-4426-B5D3-B7C69C2D4F54}" dt="2026-02-03T20:49:12.830" v="681" actId="1076"/>
           <ac:cxnSpMkLst>
@@ -1681,30 +1105,6 @@
             <ac:cxnSpMk id="12" creationId="{BEA694EB-45B4-A27B-F174-CE8DCFB2DEFA}"/>
           </ac:cxnSpMkLst>
         </pc:cxnChg>
-        <pc:cxnChg chg="del">
-          <ac:chgData name="Fatima Pillosu" userId="a6295d4dc9e22643" providerId="LiveId" clId="{87453732-75AC-4426-B5D3-B7C69C2D4F54}" dt="2026-02-03T17:40:51.189" v="61" actId="478"/>
-          <ac:cxnSpMkLst>
-            <pc:docMk/>
-            <pc:sldMk cId="1109040034" sldId="260"/>
-            <ac:cxnSpMk id="18" creationId="{F6C985F3-6C93-352F-E229-717AEE8358AB}"/>
-          </ac:cxnSpMkLst>
-        </pc:cxnChg>
-        <pc:cxnChg chg="del">
-          <ac:chgData name="Fatima Pillosu" userId="a6295d4dc9e22643" providerId="LiveId" clId="{87453732-75AC-4426-B5D3-B7C69C2D4F54}" dt="2026-02-03T17:40:51.189" v="61" actId="478"/>
-          <ac:cxnSpMkLst>
-            <pc:docMk/>
-            <pc:sldMk cId="1109040034" sldId="260"/>
-            <ac:cxnSpMk id="19" creationId="{566335E3-6D71-FA14-F5C1-08C7F3EB0668}"/>
-          </ac:cxnSpMkLst>
-        </pc:cxnChg>
-        <pc:cxnChg chg="del">
-          <ac:chgData name="Fatima Pillosu" userId="a6295d4dc9e22643" providerId="LiveId" clId="{87453732-75AC-4426-B5D3-B7C69C2D4F54}" dt="2026-02-03T17:40:51.189" v="61" actId="478"/>
-          <ac:cxnSpMkLst>
-            <pc:docMk/>
-            <pc:sldMk cId="1109040034" sldId="260"/>
-            <ac:cxnSpMk id="20" creationId="{3B527D73-E386-B5D7-0A61-B478430300C9}"/>
-          </ac:cxnSpMkLst>
-        </pc:cxnChg>
       </pc:sldChg>
       <pc:sldChg chg="addSp delSp modSp add mod">
         <pc:chgData name="Fatima Pillosu" userId="a6295d4dc9e22643" providerId="LiveId" clId="{87453732-75AC-4426-B5D3-B7C69C2D4F54}" dt="2026-02-03T21:09:37.145" v="1067" actId="14100"/>
@@ -1712,78 +1112,6 @@
           <pc:docMk/>
           <pc:sldMk cId="1840283273" sldId="261"/>
         </pc:sldMkLst>
-        <pc:spChg chg="del">
-          <ac:chgData name="Fatima Pillosu" userId="a6295d4dc9e22643" providerId="LiveId" clId="{87453732-75AC-4426-B5D3-B7C69C2D4F54}" dt="2026-02-03T17:41:42.840" v="74" actId="478"/>
-          <ac:spMkLst>
-            <pc:docMk/>
-            <pc:sldMk cId="1840283273" sldId="261"/>
-            <ac:spMk id="9" creationId="{57E8AF0A-FC7F-80A8-AB1E-EA7D46E3FDBE}"/>
-          </ac:spMkLst>
-        </pc:spChg>
-        <pc:spChg chg="del">
-          <ac:chgData name="Fatima Pillosu" userId="a6295d4dc9e22643" providerId="LiveId" clId="{87453732-75AC-4426-B5D3-B7C69C2D4F54}" dt="2026-02-03T17:41:42.840" v="74" actId="478"/>
-          <ac:spMkLst>
-            <pc:docMk/>
-            <pc:sldMk cId="1840283273" sldId="261"/>
-            <ac:spMk id="13" creationId="{A82322B3-310E-A48E-21EF-4E59910E4DBE}"/>
-          </ac:spMkLst>
-        </pc:spChg>
-        <pc:spChg chg="del">
-          <ac:chgData name="Fatima Pillosu" userId="a6295d4dc9e22643" providerId="LiveId" clId="{87453732-75AC-4426-B5D3-B7C69C2D4F54}" dt="2026-02-03T17:41:42.840" v="74" actId="478"/>
-          <ac:spMkLst>
-            <pc:docMk/>
-            <pc:sldMk cId="1840283273" sldId="261"/>
-            <ac:spMk id="14" creationId="{F7BE154A-87F3-57D0-7B07-C5E979E6CD8B}"/>
-          </ac:spMkLst>
-        </pc:spChg>
-        <pc:spChg chg="del">
-          <ac:chgData name="Fatima Pillosu" userId="a6295d4dc9e22643" providerId="LiveId" clId="{87453732-75AC-4426-B5D3-B7C69C2D4F54}" dt="2026-02-03T17:41:42.840" v="74" actId="478"/>
-          <ac:spMkLst>
-            <pc:docMk/>
-            <pc:sldMk cId="1840283273" sldId="261"/>
-            <ac:spMk id="15" creationId="{E60A8FA0-B5CB-5E37-2953-AD002A935201}"/>
-          </ac:spMkLst>
-        </pc:spChg>
-        <pc:spChg chg="del">
-          <ac:chgData name="Fatima Pillosu" userId="a6295d4dc9e22643" providerId="LiveId" clId="{87453732-75AC-4426-B5D3-B7C69C2D4F54}" dt="2026-02-03T17:41:52.727" v="78" actId="478"/>
-          <ac:spMkLst>
-            <pc:docMk/>
-            <pc:sldMk cId="1840283273" sldId="261"/>
-            <ac:spMk id="16" creationId="{2A0FE19A-0E5D-B3F8-E6FF-E228FE5F5F9D}"/>
-          </ac:spMkLst>
-        </pc:spChg>
-        <pc:spChg chg="add del mod">
-          <ac:chgData name="Fatima Pillosu" userId="a6295d4dc9e22643" providerId="LiveId" clId="{87453732-75AC-4426-B5D3-B7C69C2D4F54}" dt="2026-02-03T17:41:52.727" v="78" actId="478"/>
-          <ac:spMkLst>
-            <pc:docMk/>
-            <pc:sldMk cId="1840283273" sldId="261"/>
-            <ac:spMk id="17" creationId="{5C5A29B5-7E29-D92C-FF95-8A5B1F592E44}"/>
-          </ac:spMkLst>
-        </pc:spChg>
-        <pc:spChg chg="del">
-          <ac:chgData name="Fatima Pillosu" userId="a6295d4dc9e22643" providerId="LiveId" clId="{87453732-75AC-4426-B5D3-B7C69C2D4F54}" dt="2026-02-03T17:41:52.727" v="78" actId="478"/>
-          <ac:spMkLst>
-            <pc:docMk/>
-            <pc:sldMk cId="1840283273" sldId="261"/>
-            <ac:spMk id="18" creationId="{ABEE5280-611F-4356-32E8-3CF9D9805CFB}"/>
-          </ac:spMkLst>
-        </pc:spChg>
-        <pc:spChg chg="del">
-          <ac:chgData name="Fatima Pillosu" userId="a6295d4dc9e22643" providerId="LiveId" clId="{87453732-75AC-4426-B5D3-B7C69C2D4F54}" dt="2026-02-03T17:41:52.727" v="78" actId="478"/>
-          <ac:spMkLst>
-            <pc:docMk/>
-            <pc:sldMk cId="1840283273" sldId="261"/>
-            <ac:spMk id="19" creationId="{3BB0B8D1-0543-9698-754C-A2A94CF6E3F0}"/>
-          </ac:spMkLst>
-        </pc:spChg>
-        <pc:spChg chg="add del mod">
-          <ac:chgData name="Fatima Pillosu" userId="a6295d4dc9e22643" providerId="LiveId" clId="{87453732-75AC-4426-B5D3-B7C69C2D4F54}" dt="2026-02-03T17:41:52.727" v="78" actId="478"/>
-          <ac:spMkLst>
-            <pc:docMk/>
-            <pc:sldMk cId="1840283273" sldId="261"/>
-            <ac:spMk id="20" creationId="{72129A85-578C-268B-F376-8D2C83220118}"/>
-          </ac:spMkLst>
-        </pc:spChg>
         <pc:spChg chg="add mod">
           <ac:chgData name="Fatima Pillosu" userId="a6295d4dc9e22643" providerId="LiveId" clId="{87453732-75AC-4426-B5D3-B7C69C2D4F54}" dt="2026-02-03T21:00:48.159" v="820" actId="1076"/>
           <ac:spMkLst>
@@ -1838,86 +1166,6 @@
             <pc:docMk/>
             <pc:sldMk cId="1840283273" sldId="261"/>
             <ac:spMk id="27" creationId="{426680C0-9AEE-F601-C872-DEC4A035B5EE}"/>
-          </ac:spMkLst>
-        </pc:spChg>
-        <pc:spChg chg="add del mod">
-          <ac:chgData name="Fatima Pillosu" userId="a6295d4dc9e22643" providerId="LiveId" clId="{87453732-75AC-4426-B5D3-B7C69C2D4F54}" dt="2026-02-03T17:41:58.128" v="80" actId="478"/>
-          <ac:spMkLst>
-            <pc:docMk/>
-            <pc:sldMk cId="1840283273" sldId="261"/>
-            <ac:spMk id="28" creationId="{86B7BBC4-3ADD-DFAE-6863-3A97912C63C8}"/>
-          </ac:spMkLst>
-        </pc:spChg>
-        <pc:spChg chg="del">
-          <ac:chgData name="Fatima Pillosu" userId="a6295d4dc9e22643" providerId="LiveId" clId="{87453732-75AC-4426-B5D3-B7C69C2D4F54}" dt="2026-02-03T17:41:52.727" v="78" actId="478"/>
-          <ac:spMkLst>
-            <pc:docMk/>
-            <pc:sldMk cId="1840283273" sldId="261"/>
-            <ac:spMk id="29" creationId="{2D16BCE9-1931-F25F-023E-FA3B0EC5E3DD}"/>
-          </ac:spMkLst>
-        </pc:spChg>
-        <pc:spChg chg="del">
-          <ac:chgData name="Fatima Pillosu" userId="a6295d4dc9e22643" providerId="LiveId" clId="{87453732-75AC-4426-B5D3-B7C69C2D4F54}" dt="2026-02-03T17:41:56.740" v="79" actId="478"/>
-          <ac:spMkLst>
-            <pc:docMk/>
-            <pc:sldMk cId="1840283273" sldId="261"/>
-            <ac:spMk id="30" creationId="{4F80D7D0-7C40-36B0-5ABA-384415BB5629}"/>
-          </ac:spMkLst>
-        </pc:spChg>
-        <pc:spChg chg="add del mod">
-          <ac:chgData name="Fatima Pillosu" userId="a6295d4dc9e22643" providerId="LiveId" clId="{87453732-75AC-4426-B5D3-B7C69C2D4F54}" dt="2026-02-03T17:41:52.727" v="78" actId="478"/>
-          <ac:spMkLst>
-            <pc:docMk/>
-            <pc:sldMk cId="1840283273" sldId="261"/>
-            <ac:spMk id="31" creationId="{91244756-2E09-B3F9-CB2C-9C59D5D4DA90}"/>
-          </ac:spMkLst>
-        </pc:spChg>
-        <pc:spChg chg="add del mod">
-          <ac:chgData name="Fatima Pillosu" userId="a6295d4dc9e22643" providerId="LiveId" clId="{87453732-75AC-4426-B5D3-B7C69C2D4F54}" dt="2026-02-03T17:41:56.740" v="79" actId="478"/>
-          <ac:spMkLst>
-            <pc:docMk/>
-            <pc:sldMk cId="1840283273" sldId="261"/>
-            <ac:spMk id="32" creationId="{E4CA9FCE-BABE-5A90-1DE9-8080E263FDD8}"/>
-          </ac:spMkLst>
-        </pc:spChg>
-        <pc:spChg chg="add del mod">
-          <ac:chgData name="Fatima Pillosu" userId="a6295d4dc9e22643" providerId="LiveId" clId="{87453732-75AC-4426-B5D3-B7C69C2D4F54}" dt="2026-02-03T17:41:56.740" v="79" actId="478"/>
-          <ac:spMkLst>
-            <pc:docMk/>
-            <pc:sldMk cId="1840283273" sldId="261"/>
-            <ac:spMk id="33" creationId="{19833E59-5D35-01B8-01E9-1D5A59009FC2}"/>
-          </ac:spMkLst>
-        </pc:spChg>
-        <pc:spChg chg="add del mod">
-          <ac:chgData name="Fatima Pillosu" userId="a6295d4dc9e22643" providerId="LiveId" clId="{87453732-75AC-4426-B5D3-B7C69C2D4F54}" dt="2026-02-03T17:41:56.740" v="79" actId="478"/>
-          <ac:spMkLst>
-            <pc:docMk/>
-            <pc:sldMk cId="1840283273" sldId="261"/>
-            <ac:spMk id="34" creationId="{0B7415E4-2991-0329-C049-10545CCA84D5}"/>
-          </ac:spMkLst>
-        </pc:spChg>
-        <pc:spChg chg="del">
-          <ac:chgData name="Fatima Pillosu" userId="a6295d4dc9e22643" providerId="LiveId" clId="{87453732-75AC-4426-B5D3-B7C69C2D4F54}" dt="2026-02-03T17:41:56.740" v="79" actId="478"/>
-          <ac:spMkLst>
-            <pc:docMk/>
-            <pc:sldMk cId="1840283273" sldId="261"/>
-            <ac:spMk id="35" creationId="{1EE23D03-D295-7EFE-1633-5DF2E305FBA4}"/>
-          </ac:spMkLst>
-        </pc:spChg>
-        <pc:spChg chg="del">
-          <ac:chgData name="Fatima Pillosu" userId="a6295d4dc9e22643" providerId="LiveId" clId="{87453732-75AC-4426-B5D3-B7C69C2D4F54}" dt="2026-02-03T17:41:56.740" v="79" actId="478"/>
-          <ac:spMkLst>
-            <pc:docMk/>
-            <pc:sldMk cId="1840283273" sldId="261"/>
-            <ac:spMk id="36" creationId="{E585004C-BF41-6DE8-4927-03F572AE104E}"/>
-          </ac:spMkLst>
-        </pc:spChg>
-        <pc:spChg chg="del">
-          <ac:chgData name="Fatima Pillosu" userId="a6295d4dc9e22643" providerId="LiveId" clId="{87453732-75AC-4426-B5D3-B7C69C2D4F54}" dt="2026-02-03T17:41:56.740" v="79" actId="478"/>
-          <ac:spMkLst>
-            <pc:docMk/>
-            <pc:sldMk cId="1840283273" sldId="261"/>
-            <ac:spMk id="37" creationId="{CB27E303-6AC9-17A3-65AF-8ED6E69DD13B}"/>
           </ac:spMkLst>
         </pc:spChg>
         <pc:spChg chg="mod">
@@ -1984,14 +1232,6 @@
             <ac:spMk id="46" creationId="{CC083195-70F1-A78E-91B3-3256E6FD81C9}"/>
           </ac:spMkLst>
         </pc:spChg>
-        <pc:spChg chg="del">
-          <ac:chgData name="Fatima Pillosu" userId="a6295d4dc9e22643" providerId="LiveId" clId="{87453732-75AC-4426-B5D3-B7C69C2D4F54}" dt="2026-02-03T17:41:42.840" v="74" actId="478"/>
-          <ac:spMkLst>
-            <pc:docMk/>
-            <pc:sldMk cId="1840283273" sldId="261"/>
-            <ac:spMk id="47" creationId="{50C0FA06-4C8D-0282-5ECC-C077B07AB87C}"/>
-          </ac:spMkLst>
-        </pc:spChg>
         <pc:spChg chg="add mod">
           <ac:chgData name="Fatima Pillosu" userId="a6295d4dc9e22643" providerId="LiveId" clId="{87453732-75AC-4426-B5D3-B7C69C2D4F54}" dt="2026-02-03T21:08:43.715" v="1050" actId="1035"/>
           <ac:spMkLst>
@@ -2040,14 +1280,6 @@
             <ac:spMk id="53" creationId="{F69F95F1-30B1-D33F-E869-A7DCC4AE41CF}"/>
           </ac:spMkLst>
         </pc:spChg>
-        <pc:picChg chg="add del mod">
-          <ac:chgData name="Fatima Pillosu" userId="a6295d4dc9e22643" providerId="LiveId" clId="{87453732-75AC-4426-B5D3-B7C69C2D4F54}" dt="2026-02-03T21:00:59.408" v="822" actId="21"/>
-          <ac:picMkLst>
-            <pc:docMk/>
-            <pc:sldMk cId="1840283273" sldId="261"/>
-            <ac:picMk id="38" creationId="{6F31ABE5-89DE-A2B6-4901-5E25DDB8FCE5}"/>
-          </ac:picMkLst>
-        </pc:picChg>
         <pc:picChg chg="add mod">
           <ac:chgData name="Fatima Pillosu" userId="a6295d4dc9e22643" providerId="LiveId" clId="{87453732-75AC-4426-B5D3-B7C69C2D4F54}" dt="2026-02-03T21:05:38.832" v="880" actId="1038"/>
           <ac:picMkLst>
@@ -2080,101 +1312,13 @@
             <ac:cxnSpMk id="4" creationId="{C19297FD-62F4-6E21-8501-54121D646763}"/>
           </ac:cxnSpMkLst>
         </pc:cxnChg>
-        <pc:cxnChg chg="del">
-          <ac:chgData name="Fatima Pillosu" userId="a6295d4dc9e22643" providerId="LiveId" clId="{87453732-75AC-4426-B5D3-B7C69C2D4F54}" dt="2026-02-03T17:41:42.840" v="74" actId="478"/>
-          <ac:cxnSpMkLst>
-            <pc:docMk/>
-            <pc:sldMk cId="1840283273" sldId="261"/>
-            <ac:cxnSpMk id="5" creationId="{6A19C2F4-B5A1-0AAA-3C9F-EEEE3DE6497D}"/>
-          </ac:cxnSpMkLst>
-        </pc:cxnChg>
-        <pc:cxnChg chg="del">
-          <ac:chgData name="Fatima Pillosu" userId="a6295d4dc9e22643" providerId="LiveId" clId="{87453732-75AC-4426-B5D3-B7C69C2D4F54}" dt="2026-02-03T17:41:42.840" v="74" actId="478"/>
-          <ac:cxnSpMkLst>
-            <pc:docMk/>
-            <pc:sldMk cId="1840283273" sldId="261"/>
-            <ac:cxnSpMk id="6" creationId="{A25B8F4D-F9B1-3AF8-17DA-926ABC503829}"/>
-          </ac:cxnSpMkLst>
-        </pc:cxnChg>
-        <pc:cxnChg chg="del">
-          <ac:chgData name="Fatima Pillosu" userId="a6295d4dc9e22643" providerId="LiveId" clId="{87453732-75AC-4426-B5D3-B7C69C2D4F54}" dt="2026-02-03T17:41:42.840" v="74" actId="478"/>
-          <ac:cxnSpMkLst>
-            <pc:docMk/>
-            <pc:sldMk cId="1840283273" sldId="261"/>
-            <ac:cxnSpMk id="10" creationId="{932A5B51-CFC7-1A15-91BC-7223E8E2FFE3}"/>
-          </ac:cxnSpMkLst>
-        </pc:cxnChg>
-        <pc:cxnChg chg="del">
-          <ac:chgData name="Fatima Pillosu" userId="a6295d4dc9e22643" providerId="LiveId" clId="{87453732-75AC-4426-B5D3-B7C69C2D4F54}" dt="2026-02-03T17:41:42.840" v="74" actId="478"/>
-          <ac:cxnSpMkLst>
-            <pc:docMk/>
-            <pc:sldMk cId="1840283273" sldId="261"/>
-            <ac:cxnSpMk id="11" creationId="{C677C05C-5D7E-5FEA-4C72-766D2F4757BE}"/>
-          </ac:cxnSpMkLst>
-        </pc:cxnChg>
-        <pc:cxnChg chg="del">
-          <ac:chgData name="Fatima Pillosu" userId="a6295d4dc9e22643" providerId="LiveId" clId="{87453732-75AC-4426-B5D3-B7C69C2D4F54}" dt="2026-02-03T17:41:42.840" v="74" actId="478"/>
-          <ac:cxnSpMkLst>
-            <pc:docMk/>
-            <pc:sldMk cId="1840283273" sldId="261"/>
-            <ac:cxnSpMk id="12" creationId="{4588F01C-6C16-84C0-4513-28454383D701}"/>
-          </ac:cxnSpMkLst>
-        </pc:cxnChg>
-        <pc:cxnChg chg="add del mod">
-          <ac:chgData name="Fatima Pillosu" userId="a6295d4dc9e22643" providerId="LiveId" clId="{87453732-75AC-4426-B5D3-B7C69C2D4F54}" dt="2026-02-03T21:09:21.554" v="1065" actId="478"/>
-          <ac:cxnSpMkLst>
-            <pc:docMk/>
-            <pc:sldMk cId="1840283273" sldId="261"/>
-            <ac:cxnSpMk id="54" creationId="{845F57AB-13FF-6852-661E-A28614A87F98}"/>
-          </ac:cxnSpMkLst>
-        </pc:cxnChg>
-        <pc:cxnChg chg="add del mod">
-          <ac:chgData name="Fatima Pillosu" userId="a6295d4dc9e22643" providerId="LiveId" clId="{87453732-75AC-4426-B5D3-B7C69C2D4F54}" dt="2026-02-03T21:09:20.901" v="1064" actId="478"/>
-          <ac:cxnSpMkLst>
-            <pc:docMk/>
-            <pc:sldMk cId="1840283273" sldId="261"/>
-            <ac:cxnSpMk id="55" creationId="{F18832B9-4740-A726-467C-68EB018B69EE}"/>
-          </ac:cxnSpMkLst>
-        </pc:cxnChg>
-        <pc:cxnChg chg="add del mod">
-          <ac:chgData name="Fatima Pillosu" userId="a6295d4dc9e22643" providerId="LiveId" clId="{87453732-75AC-4426-B5D3-B7C69C2D4F54}" dt="2026-02-03T21:09:20.233" v="1063" actId="478"/>
-          <ac:cxnSpMkLst>
-            <pc:docMk/>
-            <pc:sldMk cId="1840283273" sldId="261"/>
-            <ac:cxnSpMk id="57" creationId="{2E065DD8-A6E0-9EAD-F719-983CFF2B7BCB}"/>
-          </ac:cxnSpMkLst>
-        </pc:cxnChg>
-        <pc:cxnChg chg="add del mod">
-          <ac:chgData name="Fatima Pillosu" userId="a6295d4dc9e22643" providerId="LiveId" clId="{87453732-75AC-4426-B5D3-B7C69C2D4F54}" dt="2026-02-03T21:09:19.038" v="1062" actId="478"/>
-          <ac:cxnSpMkLst>
-            <pc:docMk/>
-            <pc:sldMk cId="1840283273" sldId="261"/>
-            <ac:cxnSpMk id="58" creationId="{F9BDEEA8-EAED-9AD5-9503-CEE3D78C3FB6}"/>
-          </ac:cxnSpMkLst>
-        </pc:cxnChg>
       </pc:sldChg>
       <pc:sldChg chg="addSp delSp modSp new mod">
-        <pc:chgData name="Fatima Pillosu" userId="a6295d4dc9e22643" providerId="LiveId" clId="{87453732-75AC-4426-B5D3-B7C69C2D4F54}" dt="2026-02-03T21:17:32.629" v="1195" actId="1037"/>
+        <pc:chgData name="Fatima Pillosu" userId="a6295d4dc9e22643" providerId="LiveId" clId="{87453732-75AC-4426-B5D3-B7C69C2D4F54}" dt="2026-02-08T23:15:50.669" v="1199" actId="20577"/>
         <pc:sldMkLst>
           <pc:docMk/>
           <pc:sldMk cId="1065612441" sldId="262"/>
         </pc:sldMkLst>
-        <pc:spChg chg="del">
-          <ac:chgData name="Fatima Pillosu" userId="a6295d4dc9e22643" providerId="LiveId" clId="{87453732-75AC-4426-B5D3-B7C69C2D4F54}" dt="2026-02-03T20:33:18.530" v="139" actId="478"/>
-          <ac:spMkLst>
-            <pc:docMk/>
-            <pc:sldMk cId="1065612441" sldId="262"/>
-            <ac:spMk id="2" creationId="{1B5AB01B-2E77-4933-46B9-1209A88D1421}"/>
-          </ac:spMkLst>
-        </pc:spChg>
-        <pc:spChg chg="del">
-          <ac:chgData name="Fatima Pillosu" userId="a6295d4dc9e22643" providerId="LiveId" clId="{87453732-75AC-4426-B5D3-B7C69C2D4F54}" dt="2026-02-03T20:33:19.613" v="140" actId="478"/>
-          <ac:spMkLst>
-            <pc:docMk/>
-            <pc:sldMk cId="1065612441" sldId="262"/>
-            <ac:spMk id="3" creationId="{57F448C5-3AC7-5852-1EB1-B544622C25A4}"/>
-          </ac:spMkLst>
-        </pc:spChg>
         <pc:spChg chg="add mod">
           <ac:chgData name="Fatima Pillosu" userId="a6295d4dc9e22643" providerId="LiveId" clId="{87453732-75AC-4426-B5D3-B7C69C2D4F54}" dt="2026-02-03T20:33:29.363" v="142" actId="207"/>
           <ac:spMkLst>
@@ -2189,270 +1333,6 @@
             <pc:docMk/>
             <pc:sldMk cId="1065612441" sldId="262"/>
             <ac:spMk id="5" creationId="{04B3B7E0-B6FE-E888-7274-CADBBC328FCA}"/>
-          </ac:spMkLst>
-        </pc:spChg>
-        <pc:spChg chg="add mod">
-          <ac:chgData name="Fatima Pillosu" userId="a6295d4dc9e22643" providerId="LiveId" clId="{87453732-75AC-4426-B5D3-B7C69C2D4F54}" dt="2026-02-03T20:38:47.422" v="279" actId="207"/>
-          <ac:spMkLst>
-            <pc:docMk/>
-            <pc:sldMk cId="1065612441" sldId="262"/>
-            <ac:spMk id="7" creationId="{08912AFC-ACA4-795E-02E6-346698870F3B}"/>
-          </ac:spMkLst>
-        </pc:spChg>
-        <pc:spChg chg="add del mod">
-          <ac:chgData name="Fatima Pillosu" userId="a6295d4dc9e22643" providerId="LiveId" clId="{87453732-75AC-4426-B5D3-B7C69C2D4F54}" dt="2026-02-03T20:43:04.129" v="330" actId="478"/>
-          <ac:spMkLst>
-            <pc:docMk/>
-            <pc:sldMk cId="1065612441" sldId="262"/>
-            <ac:spMk id="8" creationId="{3112C3A0-821F-3CAE-2473-B3E7DD08D43B}"/>
-          </ac:spMkLst>
-        </pc:spChg>
-        <pc:spChg chg="add del mod">
-          <ac:chgData name="Fatima Pillosu" userId="a6295d4dc9e22643" providerId="LiveId" clId="{87453732-75AC-4426-B5D3-B7C69C2D4F54}" dt="2026-02-03T20:43:04.129" v="330" actId="478"/>
-          <ac:spMkLst>
-            <pc:docMk/>
-            <pc:sldMk cId="1065612441" sldId="262"/>
-            <ac:spMk id="9" creationId="{9126AEB6-52EB-99E2-D527-E67B23BB55D9}"/>
-          </ac:spMkLst>
-        </pc:spChg>
-        <pc:spChg chg="add del mod">
-          <ac:chgData name="Fatima Pillosu" userId="a6295d4dc9e22643" providerId="LiveId" clId="{87453732-75AC-4426-B5D3-B7C69C2D4F54}" dt="2026-02-03T20:43:04.129" v="330" actId="478"/>
-          <ac:spMkLst>
-            <pc:docMk/>
-            <pc:sldMk cId="1065612441" sldId="262"/>
-            <ac:spMk id="10" creationId="{7B0309CA-2FEB-BEF7-61B1-B04868C46C23}"/>
-          </ac:spMkLst>
-        </pc:spChg>
-        <pc:spChg chg="add del mod">
-          <ac:chgData name="Fatima Pillosu" userId="a6295d4dc9e22643" providerId="LiveId" clId="{87453732-75AC-4426-B5D3-B7C69C2D4F54}" dt="2026-02-03T20:43:04.129" v="330" actId="478"/>
-          <ac:spMkLst>
-            <pc:docMk/>
-            <pc:sldMk cId="1065612441" sldId="262"/>
-            <ac:spMk id="11" creationId="{6454394E-0F21-936C-C68A-7667591CE4A3}"/>
-          </ac:spMkLst>
-        </pc:spChg>
-        <pc:spChg chg="add del mod">
-          <ac:chgData name="Fatima Pillosu" userId="a6295d4dc9e22643" providerId="LiveId" clId="{87453732-75AC-4426-B5D3-B7C69C2D4F54}" dt="2026-02-03T20:43:04.129" v="330" actId="478"/>
-          <ac:spMkLst>
-            <pc:docMk/>
-            <pc:sldMk cId="1065612441" sldId="262"/>
-            <ac:spMk id="12" creationId="{8BB35FCE-CEA3-C603-1EA6-F4825BF62540}"/>
-          </ac:spMkLst>
-        </pc:spChg>
-        <pc:spChg chg="add del mod">
-          <ac:chgData name="Fatima Pillosu" userId="a6295d4dc9e22643" providerId="LiveId" clId="{87453732-75AC-4426-B5D3-B7C69C2D4F54}" dt="2026-02-03T20:43:04.129" v="330" actId="478"/>
-          <ac:spMkLst>
-            <pc:docMk/>
-            <pc:sldMk cId="1065612441" sldId="262"/>
-            <ac:spMk id="13" creationId="{48AB28B0-3062-C9F6-4A85-88ECA3DC9BEA}"/>
-          </ac:spMkLst>
-        </pc:spChg>
-        <pc:spChg chg="add del mod">
-          <ac:chgData name="Fatima Pillosu" userId="a6295d4dc9e22643" providerId="LiveId" clId="{87453732-75AC-4426-B5D3-B7C69C2D4F54}" dt="2026-02-03T20:43:04.129" v="330" actId="478"/>
-          <ac:spMkLst>
-            <pc:docMk/>
-            <pc:sldMk cId="1065612441" sldId="262"/>
-            <ac:spMk id="14" creationId="{08C8212F-672A-6CFC-C470-6C1DDCC14743}"/>
-          </ac:spMkLst>
-        </pc:spChg>
-        <pc:spChg chg="add del mod">
-          <ac:chgData name="Fatima Pillosu" userId="a6295d4dc9e22643" providerId="LiveId" clId="{87453732-75AC-4426-B5D3-B7C69C2D4F54}" dt="2026-02-03T20:43:04.129" v="330" actId="478"/>
-          <ac:spMkLst>
-            <pc:docMk/>
-            <pc:sldMk cId="1065612441" sldId="262"/>
-            <ac:spMk id="15" creationId="{EFC881F3-D12A-04C2-9C76-78D622C8B2D4}"/>
-          </ac:spMkLst>
-        </pc:spChg>
-        <pc:spChg chg="del mod">
-          <ac:chgData name="Fatima Pillosu" userId="a6295d4dc9e22643" providerId="LiveId" clId="{87453732-75AC-4426-B5D3-B7C69C2D4F54}" dt="2026-02-03T20:43:04.129" v="330" actId="478"/>
-          <ac:spMkLst>
-            <pc:docMk/>
-            <pc:sldMk cId="1065612441" sldId="262"/>
-            <ac:spMk id="16" creationId="{0053BB53-5376-D6CE-A709-B36116EAB419}"/>
-          </ac:spMkLst>
-        </pc:spChg>
-        <pc:spChg chg="add mod">
-          <ac:chgData name="Fatima Pillosu" userId="a6295d4dc9e22643" providerId="LiveId" clId="{87453732-75AC-4426-B5D3-B7C69C2D4F54}" dt="2026-02-03T20:39:38.421" v="285" actId="1036"/>
-          <ac:spMkLst>
-            <pc:docMk/>
-            <pc:sldMk cId="1065612441" sldId="262"/>
-            <ac:spMk id="17" creationId="{49010AE4-DF15-B2B1-2686-4FC137E849FE}"/>
-          </ac:spMkLst>
-        </pc:spChg>
-        <pc:spChg chg="add del mod">
-          <ac:chgData name="Fatima Pillosu" userId="a6295d4dc9e22643" providerId="LiveId" clId="{87453732-75AC-4426-B5D3-B7C69C2D4F54}" dt="2026-02-03T20:43:04.129" v="330" actId="478"/>
-          <ac:spMkLst>
-            <pc:docMk/>
-            <pc:sldMk cId="1065612441" sldId="262"/>
-            <ac:spMk id="18" creationId="{44A755C2-41B1-494E-6B53-07A68A894945}"/>
-          </ac:spMkLst>
-        </pc:spChg>
-        <pc:spChg chg="add mod">
-          <ac:chgData name="Fatima Pillosu" userId="a6295d4dc9e22643" providerId="LiveId" clId="{87453732-75AC-4426-B5D3-B7C69C2D4F54}" dt="2026-02-03T20:40:40.269" v="290" actId="1076"/>
-          <ac:spMkLst>
-            <pc:docMk/>
-            <pc:sldMk cId="1065612441" sldId="262"/>
-            <ac:spMk id="20" creationId="{7E19099B-245A-4A37-80AC-EFBCA3C8B854}"/>
-          </ac:spMkLst>
-        </pc:spChg>
-        <pc:spChg chg="add del mod">
-          <ac:chgData name="Fatima Pillosu" userId="a6295d4dc9e22643" providerId="LiveId" clId="{87453732-75AC-4426-B5D3-B7C69C2D4F54}" dt="2026-02-03T20:41:03.858" v="296" actId="478"/>
-          <ac:spMkLst>
-            <pc:docMk/>
-            <pc:sldMk cId="1065612441" sldId="262"/>
-            <ac:spMk id="21" creationId="{8F16DE3C-11CB-BD09-A204-2A699EA607BD}"/>
-          </ac:spMkLst>
-        </pc:spChg>
-        <pc:spChg chg="add del mod">
-          <ac:chgData name="Fatima Pillosu" userId="a6295d4dc9e22643" providerId="LiveId" clId="{87453732-75AC-4426-B5D3-B7C69C2D4F54}" dt="2026-02-03T20:41:03.858" v="296" actId="478"/>
-          <ac:spMkLst>
-            <pc:docMk/>
-            <pc:sldMk cId="1065612441" sldId="262"/>
-            <ac:spMk id="23" creationId="{D6DB721C-06D5-1357-FABF-ABC2FD1DD97C}"/>
-          </ac:spMkLst>
-        </pc:spChg>
-        <pc:spChg chg="add mod">
-          <ac:chgData name="Fatima Pillosu" userId="a6295d4dc9e22643" providerId="LiveId" clId="{87453732-75AC-4426-B5D3-B7C69C2D4F54}" dt="2026-02-03T20:40:40.269" v="290" actId="1076"/>
-          <ac:spMkLst>
-            <pc:docMk/>
-            <pc:sldMk cId="1065612441" sldId="262"/>
-            <ac:spMk id="24" creationId="{ABA0507F-EA29-3766-A4A6-A3F0AF2D7E8C}"/>
-          </ac:spMkLst>
-        </pc:spChg>
-        <pc:spChg chg="add mod">
-          <ac:chgData name="Fatima Pillosu" userId="a6295d4dc9e22643" providerId="LiveId" clId="{87453732-75AC-4426-B5D3-B7C69C2D4F54}" dt="2026-02-03T20:40:40.269" v="290" actId="1076"/>
-          <ac:spMkLst>
-            <pc:docMk/>
-            <pc:sldMk cId="1065612441" sldId="262"/>
-            <ac:spMk id="25" creationId="{7C00C048-678C-C492-9727-D2EDB6B35D54}"/>
-          </ac:spMkLst>
-        </pc:spChg>
-        <pc:spChg chg="add del mod">
-          <ac:chgData name="Fatima Pillosu" userId="a6295d4dc9e22643" providerId="LiveId" clId="{87453732-75AC-4426-B5D3-B7C69C2D4F54}" dt="2026-02-03T20:41:03.858" v="296" actId="478"/>
-          <ac:spMkLst>
-            <pc:docMk/>
-            <pc:sldMk cId="1065612441" sldId="262"/>
-            <ac:spMk id="26" creationId="{316E2988-42F1-EC4B-521A-3416A6D35949}"/>
-          </ac:spMkLst>
-        </pc:spChg>
-        <pc:spChg chg="add del mod">
-          <ac:chgData name="Fatima Pillosu" userId="a6295d4dc9e22643" providerId="LiveId" clId="{87453732-75AC-4426-B5D3-B7C69C2D4F54}" dt="2026-02-03T20:41:03.858" v="296" actId="478"/>
-          <ac:spMkLst>
-            <pc:docMk/>
-            <pc:sldMk cId="1065612441" sldId="262"/>
-            <ac:spMk id="27" creationId="{E022B435-3B63-1559-5069-FCB1BD371C70}"/>
-          </ac:spMkLst>
-        </pc:spChg>
-        <pc:spChg chg="add del mod">
-          <ac:chgData name="Fatima Pillosu" userId="a6295d4dc9e22643" providerId="LiveId" clId="{87453732-75AC-4426-B5D3-B7C69C2D4F54}" dt="2026-02-03T20:41:03.858" v="296" actId="478"/>
-          <ac:spMkLst>
-            <pc:docMk/>
-            <pc:sldMk cId="1065612441" sldId="262"/>
-            <ac:spMk id="29" creationId="{DE31817B-236C-8487-AA60-A62532D85B96}"/>
-          </ac:spMkLst>
-        </pc:spChg>
-        <pc:spChg chg="add del mod">
-          <ac:chgData name="Fatima Pillosu" userId="a6295d4dc9e22643" providerId="LiveId" clId="{87453732-75AC-4426-B5D3-B7C69C2D4F54}" dt="2026-02-03T20:41:03.858" v="296" actId="478"/>
-          <ac:spMkLst>
-            <pc:docMk/>
-            <pc:sldMk cId="1065612441" sldId="262"/>
-            <ac:spMk id="30" creationId="{EDE5D1B7-1874-6DA6-4317-567F3C78D64A}"/>
-          </ac:spMkLst>
-        </pc:spChg>
-        <pc:spChg chg="add del mod">
-          <ac:chgData name="Fatima Pillosu" userId="a6295d4dc9e22643" providerId="LiveId" clId="{87453732-75AC-4426-B5D3-B7C69C2D4F54}" dt="2026-02-03T20:41:03.858" v="296" actId="478"/>
-          <ac:spMkLst>
-            <pc:docMk/>
-            <pc:sldMk cId="1065612441" sldId="262"/>
-            <ac:spMk id="31" creationId="{4A15E323-2C66-044F-F7E3-38AC3CEFC1E5}"/>
-          </ac:spMkLst>
-        </pc:spChg>
-        <pc:spChg chg="add mod">
-          <ac:chgData name="Fatima Pillosu" userId="a6295d4dc9e22643" providerId="LiveId" clId="{87453732-75AC-4426-B5D3-B7C69C2D4F54}" dt="2026-02-03T20:40:44.708" v="292" actId="1076"/>
-          <ac:spMkLst>
-            <pc:docMk/>
-            <pc:sldMk cId="1065612441" sldId="262"/>
-            <ac:spMk id="33" creationId="{CB4CCBB3-273B-77C8-69AC-3B2447EF5E41}"/>
-          </ac:spMkLst>
-        </pc:spChg>
-        <pc:spChg chg="add mod">
-          <ac:chgData name="Fatima Pillosu" userId="a6295d4dc9e22643" providerId="LiveId" clId="{87453732-75AC-4426-B5D3-B7C69C2D4F54}" dt="2026-02-03T20:40:44.708" v="292" actId="1076"/>
-          <ac:spMkLst>
-            <pc:docMk/>
-            <pc:sldMk cId="1065612441" sldId="262"/>
-            <ac:spMk id="34" creationId="{E65FE302-F9D2-8D1E-FEEB-A0DBA1621677}"/>
-          </ac:spMkLst>
-        </pc:spChg>
-        <pc:spChg chg="add mod">
-          <ac:chgData name="Fatima Pillosu" userId="a6295d4dc9e22643" providerId="LiveId" clId="{87453732-75AC-4426-B5D3-B7C69C2D4F54}" dt="2026-02-03T20:40:44.708" v="292" actId="1076"/>
-          <ac:spMkLst>
-            <pc:docMk/>
-            <pc:sldMk cId="1065612441" sldId="262"/>
-            <ac:spMk id="35" creationId="{2AE4869A-EF57-3709-C30A-B548B2926C79}"/>
-          </ac:spMkLst>
-        </pc:spChg>
-        <pc:spChg chg="del">
-          <ac:chgData name="Fatima Pillosu" userId="a6295d4dc9e22643" providerId="LiveId" clId="{87453732-75AC-4426-B5D3-B7C69C2D4F54}" dt="2026-02-03T20:41:03.858" v="296" actId="478"/>
-          <ac:spMkLst>
-            <pc:docMk/>
-            <pc:sldMk cId="1065612441" sldId="262"/>
-            <ac:spMk id="36" creationId="{D40712E1-9AF9-EB83-3977-F6D0744A670D}"/>
-          </ac:spMkLst>
-        </pc:spChg>
-        <pc:spChg chg="add mod">
-          <ac:chgData name="Fatima Pillosu" userId="a6295d4dc9e22643" providerId="LiveId" clId="{87453732-75AC-4426-B5D3-B7C69C2D4F54}" dt="2026-02-03T20:40:44.708" v="292" actId="1076"/>
-          <ac:spMkLst>
-            <pc:docMk/>
-            <pc:sldMk cId="1065612441" sldId="262"/>
-            <ac:spMk id="37" creationId="{18973FCE-CCB6-8E3A-C759-8362060BB9D2}"/>
-          </ac:spMkLst>
-        </pc:spChg>
-        <pc:spChg chg="add del mod">
-          <ac:chgData name="Fatima Pillosu" userId="a6295d4dc9e22643" providerId="LiveId" clId="{87453732-75AC-4426-B5D3-B7C69C2D4F54}" dt="2026-02-03T20:41:03.858" v="296" actId="478"/>
-          <ac:spMkLst>
-            <pc:docMk/>
-            <pc:sldMk cId="1065612441" sldId="262"/>
-            <ac:spMk id="38" creationId="{05F580DD-D0CA-9531-F664-4FAADB863CD1}"/>
-          </ac:spMkLst>
-        </pc:spChg>
-        <pc:spChg chg="add mod">
-          <ac:chgData name="Fatima Pillosu" userId="a6295d4dc9e22643" providerId="LiveId" clId="{87453732-75AC-4426-B5D3-B7C69C2D4F54}" dt="2026-02-03T20:40:44.708" v="292" actId="1076"/>
-          <ac:spMkLst>
-            <pc:docMk/>
-            <pc:sldMk cId="1065612441" sldId="262"/>
-            <ac:spMk id="39" creationId="{84B28688-A874-FD2D-03A5-4965C6FA05A4}"/>
-          </ac:spMkLst>
-        </pc:spChg>
-        <pc:spChg chg="add mod">
-          <ac:chgData name="Fatima Pillosu" userId="a6295d4dc9e22643" providerId="LiveId" clId="{87453732-75AC-4426-B5D3-B7C69C2D4F54}" dt="2026-02-03T20:40:44.708" v="292" actId="1076"/>
-          <ac:spMkLst>
-            <pc:docMk/>
-            <pc:sldMk cId="1065612441" sldId="262"/>
-            <ac:spMk id="40" creationId="{79266987-D6AE-2AF4-8BE1-719A59D52D9F}"/>
-          </ac:spMkLst>
-        </pc:spChg>
-        <pc:spChg chg="add mod">
-          <ac:chgData name="Fatima Pillosu" userId="a6295d4dc9e22643" providerId="LiveId" clId="{87453732-75AC-4426-B5D3-B7C69C2D4F54}" dt="2026-02-03T20:40:44.708" v="292" actId="1076"/>
-          <ac:spMkLst>
-            <pc:docMk/>
-            <pc:sldMk cId="1065612441" sldId="262"/>
-            <ac:spMk id="41" creationId="{B0420EF1-4B28-9214-F801-DCCF1FCEC011}"/>
-          </ac:spMkLst>
-        </pc:spChg>
-        <pc:spChg chg="add del mod">
-          <ac:chgData name="Fatima Pillosu" userId="a6295d4dc9e22643" providerId="LiveId" clId="{87453732-75AC-4426-B5D3-B7C69C2D4F54}" dt="2026-02-03T20:41:03.858" v="296" actId="478"/>
-          <ac:spMkLst>
-            <pc:docMk/>
-            <pc:sldMk cId="1065612441" sldId="262"/>
-            <ac:spMk id="42" creationId="{9672F09F-228E-B300-C851-BFE4ABA3DFD1}"/>
-          </ac:spMkLst>
-        </pc:spChg>
-        <pc:spChg chg="add mod">
-          <ac:chgData name="Fatima Pillosu" userId="a6295d4dc9e22643" providerId="LiveId" clId="{87453732-75AC-4426-B5D3-B7C69C2D4F54}" dt="2026-02-03T20:40:44.708" v="292" actId="1076"/>
-          <ac:spMkLst>
-            <pc:docMk/>
-            <pc:sldMk cId="1065612441" sldId="262"/>
-            <ac:spMk id="43" creationId="{1CF1DC86-6B59-8654-BE94-943C8AAF8476}"/>
           </ac:spMkLst>
         </pc:spChg>
         <pc:spChg chg="add mod">
@@ -2471,16 +1351,8 @@
             <ac:spMk id="51" creationId="{EA94C325-717B-6538-1600-3AD7E22DED30}"/>
           </ac:spMkLst>
         </pc:spChg>
-        <pc:spChg chg="add del mod">
-          <ac:chgData name="Fatima Pillosu" userId="a6295d4dc9e22643" providerId="LiveId" clId="{87453732-75AC-4426-B5D3-B7C69C2D4F54}" dt="2026-02-03T20:52:56.858" v="728" actId="478"/>
-          <ac:spMkLst>
-            <pc:docMk/>
-            <pc:sldMk cId="1065612441" sldId="262"/>
-            <ac:spMk id="52" creationId="{158C12AF-DBBA-89E3-09F2-A6C1BFA9C6DB}"/>
-          </ac:spMkLst>
-        </pc:spChg>
         <pc:spChg chg="add mod">
-          <ac:chgData name="Fatima Pillosu" userId="a6295d4dc9e22643" providerId="LiveId" clId="{87453732-75AC-4426-B5D3-B7C69C2D4F54}" dt="2026-02-03T21:10:35.092" v="1092" actId="1035"/>
+          <ac:chgData name="Fatima Pillosu" userId="a6295d4dc9e22643" providerId="LiveId" clId="{87453732-75AC-4426-B5D3-B7C69C2D4F54}" dt="2026-02-08T23:15:47.768" v="1197" actId="20577"/>
           <ac:spMkLst>
             <pc:docMk/>
             <pc:sldMk cId="1065612441" sldId="262"/>
@@ -2488,7 +1360,7 @@
           </ac:spMkLst>
         </pc:spChg>
         <pc:spChg chg="add mod">
-          <ac:chgData name="Fatima Pillosu" userId="a6295d4dc9e22643" providerId="LiveId" clId="{87453732-75AC-4426-B5D3-B7C69C2D4F54}" dt="2026-02-03T21:10:35.092" v="1092" actId="1035"/>
+          <ac:chgData name="Fatima Pillosu" userId="a6295d4dc9e22643" providerId="LiveId" clId="{87453732-75AC-4426-B5D3-B7C69C2D4F54}" dt="2026-02-08T23:15:50.669" v="1199" actId="20577"/>
           <ac:spMkLst>
             <pc:docMk/>
             <pc:sldMk cId="1065612441" sldId="262"/>
@@ -2527,14 +1399,6 @@
             <ac:spMk id="62" creationId="{CA84774A-1789-EDB7-44F7-58A5AA382302}"/>
           </ac:spMkLst>
         </pc:spChg>
-        <pc:spChg chg="add del mod">
-          <ac:chgData name="Fatima Pillosu" userId="a6295d4dc9e22643" providerId="LiveId" clId="{87453732-75AC-4426-B5D3-B7C69C2D4F54}" dt="2026-02-03T21:17:10.839" v="1174" actId="478"/>
-          <ac:spMkLst>
-            <pc:docMk/>
-            <pc:sldMk cId="1065612441" sldId="262"/>
-            <ac:spMk id="63" creationId="{B6509894-5031-F909-FF5D-891BC7C964DA}"/>
-          </ac:spMkLst>
-        </pc:spChg>
         <pc:grpChg chg="add mod">
           <ac:chgData name="Fatima Pillosu" userId="a6295d4dc9e22643" providerId="LiveId" clId="{87453732-75AC-4426-B5D3-B7C69C2D4F54}" dt="2026-02-03T21:17:32.629" v="1195" actId="1037"/>
           <ac:grpSpMkLst>
@@ -2543,30 +1407,6 @@
             <ac:grpSpMk id="55" creationId="{801D5D7A-DEFB-B953-9EF8-3CD3FE6128E1}"/>
           </ac:grpSpMkLst>
         </pc:grpChg>
-        <pc:picChg chg="add mod modCrop">
-          <ac:chgData name="Fatima Pillosu" userId="a6295d4dc9e22643" providerId="LiveId" clId="{87453732-75AC-4426-B5D3-B7C69C2D4F54}" dt="2026-02-03T20:37:47.513" v="264" actId="1037"/>
-          <ac:picMkLst>
-            <pc:docMk/>
-            <pc:sldMk cId="1065612441" sldId="262"/>
-            <ac:picMk id="6" creationId="{E6D09F63-49D7-2D27-01B2-12FBFD6E67CD}"/>
-          </ac:picMkLst>
-        </pc:picChg>
-        <pc:picChg chg="add del mod">
-          <ac:chgData name="Fatima Pillosu" userId="a6295d4dc9e22643" providerId="LiveId" clId="{87453732-75AC-4426-B5D3-B7C69C2D4F54}" dt="2026-02-03T20:41:01.312" v="295" actId="478"/>
-          <ac:picMkLst>
-            <pc:docMk/>
-            <pc:sldMk cId="1065612441" sldId="262"/>
-            <ac:picMk id="45" creationId="{14E949BF-0FEA-B09B-8CCC-1810802B5DC0}"/>
-          </ac:picMkLst>
-        </pc:picChg>
-        <pc:picChg chg="add del mod">
-          <ac:chgData name="Fatima Pillosu" userId="a6295d4dc9e22643" providerId="LiveId" clId="{87453732-75AC-4426-B5D3-B7C69C2D4F54}" dt="2026-02-03T20:44:58.709" v="348" actId="478"/>
-          <ac:picMkLst>
-            <pc:docMk/>
-            <pc:sldMk cId="1065612441" sldId="262"/>
-            <ac:picMk id="46" creationId="{F166AA0A-39F5-31BC-A127-18F152ADEC76}"/>
-          </ac:picMkLst>
-        </pc:picChg>
         <pc:picChg chg="add mod">
           <ac:chgData name="Fatima Pillosu" userId="a6295d4dc9e22643" providerId="LiveId" clId="{87453732-75AC-4426-B5D3-B7C69C2D4F54}" dt="2026-02-03T21:15:09.677" v="1158" actId="1076"/>
           <ac:picMkLst>
@@ -2589,22 +1429,6 @@
             <pc:docMk/>
             <pc:sldMk cId="1065612441" sldId="262"/>
             <ac:picMk id="49" creationId="{B27EA847-06E9-1F4F-A55F-B8F3B35B351B}"/>
-          </ac:picMkLst>
-        </pc:picChg>
-        <pc:picChg chg="add del mod">
-          <ac:chgData name="Fatima Pillosu" userId="a6295d4dc9e22643" providerId="LiveId" clId="{87453732-75AC-4426-B5D3-B7C69C2D4F54}" dt="2026-02-03T21:01:14.921" v="827" actId="21"/>
-          <ac:picMkLst>
-            <pc:docMk/>
-            <pc:sldMk cId="1065612441" sldId="262"/>
-            <ac:picMk id="56" creationId="{6F31ABE5-89DE-A2B6-4901-5E25DDB8FCE5}"/>
-          </ac:picMkLst>
-        </pc:picChg>
-        <pc:picChg chg="add del mod">
-          <ac:chgData name="Fatima Pillosu" userId="a6295d4dc9e22643" providerId="LiveId" clId="{87453732-75AC-4426-B5D3-B7C69C2D4F54}" dt="2026-02-03T21:06:18.773" v="888" actId="478"/>
-          <ac:picMkLst>
-            <pc:docMk/>
-            <pc:sldMk cId="1065612441" sldId="262"/>
-            <ac:picMk id="60" creationId="{D1F4373F-A3CF-EC0C-0144-3DAC9EF068FD}"/>
           </ac:picMkLst>
         </pc:picChg>
         <pc:picChg chg="add mod">
@@ -2752,7 +1576,7 @@
           <a:p>
             <a:fld id="{4D47F475-F611-46DA-AE4C-EA48501000AE}" type="datetimeFigureOut">
               <a:rPr lang="en-GB" smtClean="0"/>
-              <a:t>03/02/2026</a:t>
+              <a:t>08/02/2026</a:t>
             </a:fld>
             <a:endParaRPr lang="en-GB"/>
           </a:p>
@@ -2922,7 +1746,7 @@
           <a:p>
             <a:fld id="{4D47F475-F611-46DA-AE4C-EA48501000AE}" type="datetimeFigureOut">
               <a:rPr lang="en-GB" smtClean="0"/>
-              <a:t>03/02/2026</a:t>
+              <a:t>08/02/2026</a:t>
             </a:fld>
             <a:endParaRPr lang="en-GB"/>
           </a:p>
@@ -3102,7 +1926,7 @@
           <a:p>
             <a:fld id="{4D47F475-F611-46DA-AE4C-EA48501000AE}" type="datetimeFigureOut">
               <a:rPr lang="en-GB" smtClean="0"/>
-              <a:t>03/02/2026</a:t>
+              <a:t>08/02/2026</a:t>
             </a:fld>
             <a:endParaRPr lang="en-GB"/>
           </a:p>
@@ -3272,7 +2096,7 @@
           <a:p>
             <a:fld id="{4D47F475-F611-46DA-AE4C-EA48501000AE}" type="datetimeFigureOut">
               <a:rPr lang="en-GB" smtClean="0"/>
-              <a:t>03/02/2026</a:t>
+              <a:t>08/02/2026</a:t>
             </a:fld>
             <a:endParaRPr lang="en-GB"/>
           </a:p>
@@ -3516,7 +2340,7 @@
           <a:p>
             <a:fld id="{4D47F475-F611-46DA-AE4C-EA48501000AE}" type="datetimeFigureOut">
               <a:rPr lang="en-GB" smtClean="0"/>
-              <a:t>03/02/2026</a:t>
+              <a:t>08/02/2026</a:t>
             </a:fld>
             <a:endParaRPr lang="en-GB"/>
           </a:p>
@@ -3748,7 +2572,7 @@
           <a:p>
             <a:fld id="{4D47F475-F611-46DA-AE4C-EA48501000AE}" type="datetimeFigureOut">
               <a:rPr lang="en-GB" smtClean="0"/>
-              <a:t>03/02/2026</a:t>
+              <a:t>08/02/2026</a:t>
             </a:fld>
             <a:endParaRPr lang="en-GB"/>
           </a:p>
@@ -4115,7 +2939,7 @@
           <a:p>
             <a:fld id="{4D47F475-F611-46DA-AE4C-EA48501000AE}" type="datetimeFigureOut">
               <a:rPr lang="en-GB" smtClean="0"/>
-              <a:t>03/02/2026</a:t>
+              <a:t>08/02/2026</a:t>
             </a:fld>
             <a:endParaRPr lang="en-GB"/>
           </a:p>
@@ -4233,7 +3057,7 @@
           <a:p>
             <a:fld id="{4D47F475-F611-46DA-AE4C-EA48501000AE}" type="datetimeFigureOut">
               <a:rPr lang="en-GB" smtClean="0"/>
-              <a:t>03/02/2026</a:t>
+              <a:t>08/02/2026</a:t>
             </a:fld>
             <a:endParaRPr lang="en-GB"/>
           </a:p>
@@ -4328,7 +3152,7 @@
           <a:p>
             <a:fld id="{4D47F475-F611-46DA-AE4C-EA48501000AE}" type="datetimeFigureOut">
               <a:rPr lang="en-GB" smtClean="0"/>
-              <a:t>03/02/2026</a:t>
+              <a:t>08/02/2026</a:t>
             </a:fld>
             <a:endParaRPr lang="en-GB"/>
           </a:p>
@@ -4605,7 +3429,7 @@
           <a:p>
             <a:fld id="{4D47F475-F611-46DA-AE4C-EA48501000AE}" type="datetimeFigureOut">
               <a:rPr lang="en-GB" smtClean="0"/>
-              <a:t>03/02/2026</a:t>
+              <a:t>08/02/2026</a:t>
             </a:fld>
             <a:endParaRPr lang="en-GB"/>
           </a:p>
@@ -4862,7 +3686,7 @@
           <a:p>
             <a:fld id="{4D47F475-F611-46DA-AE4C-EA48501000AE}" type="datetimeFigureOut">
               <a:rPr lang="en-GB" smtClean="0"/>
-              <a:t>03/02/2026</a:t>
+              <a:t>08/02/2026</a:t>
             </a:fld>
             <a:endParaRPr lang="en-GB"/>
           </a:p>
@@ -5075,7 +3899,7 @@
           <a:p>
             <a:fld id="{4D47F475-F611-46DA-AE4C-EA48501000AE}" type="datetimeFigureOut">
               <a:rPr lang="en-GB" smtClean="0"/>
-              <a:t>03/02/2026</a:t>
+              <a:t>08/02/2026</a:t>
             </a:fld>
             <a:endParaRPr lang="en-GB"/>
           </a:p>
@@ -5751,8 +4575,8 @@
             <a:chExt cx="4159265" cy="846578"/>
           </a:xfrm>
         </p:grpSpPr>
-        <mc:AlternateContent xmlns:mc="http://schemas.openxmlformats.org/markup-compatibility/2006">
-          <mc:Choice xmlns:a14="http://schemas.microsoft.com/office/drawing/2010/main" Requires="a14">
+        <mc:AlternateContent xmlns:mc="http://schemas.openxmlformats.org/markup-compatibility/2006" xmlns:a14="http://schemas.microsoft.com/office/drawing/2010/main">
+          <mc:Choice Requires="a14">
             <p:sp>
               <p:nvSpPr>
                 <p:cNvPr id="50" name="TextBox 49">
@@ -6073,7 +4897,7 @@
               </p:txBody>
             </p:sp>
           </mc:Choice>
-          <mc:Fallback>
+          <mc:Fallback xmlns="">
             <p:sp>
               <p:nvSpPr>
                 <p:cNvPr id="50" name="TextBox 49">
@@ -6118,8 +4942,8 @@
             </p:sp>
           </mc:Fallback>
         </mc:AlternateContent>
-        <mc:AlternateContent xmlns:mc="http://schemas.openxmlformats.org/markup-compatibility/2006">
-          <mc:Choice xmlns:a14="http://schemas.microsoft.com/office/drawing/2010/main" Requires="a14">
+        <mc:AlternateContent xmlns:mc="http://schemas.openxmlformats.org/markup-compatibility/2006" xmlns:a14="http://schemas.microsoft.com/office/drawing/2010/main">
+          <mc:Choice Requires="a14">
             <p:sp>
               <p:nvSpPr>
                 <p:cNvPr id="51" name="TextBox 50">
@@ -6516,7 +5340,7 @@
               </p:txBody>
             </p:sp>
           </mc:Choice>
-          <mc:Fallback>
+          <mc:Fallback xmlns="">
             <p:sp>
               <p:nvSpPr>
                 <p:cNvPr id="51" name="TextBox 50">
@@ -6703,7 +5527,7 @@
                 </a:solidFill>
                 <a:latin typeface="Aptos" panose="020B0004020202020204" pitchFamily="34" charset="0"/>
               </a:rPr>
-              <a:t> = 0.952</a:t>
+              <a:t> = 0.953</a:t>
             </a:r>
           </a:p>
         </p:txBody>
@@ -6836,8 +5660,23 @@
                 </a:solidFill>
                 <a:latin typeface="Aptos" panose="020B0004020202020204" pitchFamily="34" charset="0"/>
               </a:rPr>
-              <a:t> = 0.952</a:t>
-            </a:r>
+              <a:t> </a:t>
+            </a:r>
+            <a:r>
+              <a:rPr lang="en-GB" sz="800" b="1">
+                <a:solidFill>
+                  <a:srgbClr val="7030A0"/>
+                </a:solidFill>
+                <a:latin typeface="Aptos" panose="020B0004020202020204" pitchFamily="34" charset="0"/>
+              </a:rPr>
+              <a:t>= 0.953</a:t>
+            </a:r>
+            <a:endParaRPr lang="en-GB" sz="800" b="1" dirty="0">
+              <a:solidFill>
+                <a:srgbClr val="7030A0"/>
+              </a:solidFill>
+              <a:latin typeface="Aptos" panose="020B0004020202020204" pitchFamily="34" charset="0"/>
+            </a:endParaRPr>
           </a:p>
         </p:txBody>
       </p:sp>
@@ -15011,8 +13850,8 @@
           </a:p>
         </p:txBody>
       </p:sp>
-      <mc:AlternateContent xmlns:mc="http://schemas.openxmlformats.org/markup-compatibility/2006">
-        <mc:Choice xmlns:a14="http://schemas.microsoft.com/office/drawing/2010/main" Requires="a14">
+      <mc:AlternateContent xmlns:mc="http://schemas.openxmlformats.org/markup-compatibility/2006" xmlns:a14="http://schemas.microsoft.com/office/drawing/2010/main">
+        <mc:Choice Requires="a14">
           <p:sp>
             <p:nvSpPr>
               <p:cNvPr id="288" name="TextBox 287">
@@ -15333,7 +14172,7 @@
             </p:txBody>
           </p:sp>
         </mc:Choice>
-        <mc:Fallback>
+        <mc:Fallback xmlns="">
           <p:sp>
             <p:nvSpPr>
               <p:cNvPr id="288" name="TextBox 287">
@@ -15804,8 +14643,8 @@
           </a:p>
         </p:txBody>
       </p:sp>
-      <mc:AlternateContent xmlns:mc="http://schemas.openxmlformats.org/markup-compatibility/2006">
-        <mc:Choice xmlns:a14="http://schemas.microsoft.com/office/drawing/2010/main" Requires="a14">
+      <mc:AlternateContent xmlns:mc="http://schemas.openxmlformats.org/markup-compatibility/2006" xmlns:a14="http://schemas.microsoft.com/office/drawing/2010/main">
+        <mc:Choice Requires="a14">
           <p:sp>
             <p:nvSpPr>
               <p:cNvPr id="296" name="TextBox 295">
@@ -16202,7 +15041,7 @@
             </p:txBody>
           </p:sp>
         </mc:Choice>
-        <mc:Fallback>
+        <mc:Fallback xmlns="">
           <p:sp>
             <p:nvSpPr>
               <p:cNvPr id="296" name="TextBox 295">

</xml_diff>

<commit_message>
corrected box in panel d
</commit_message>
<xml_diff>
--- a/Figures/03_MAE_Schematic.pptx
+++ b/Figures/03_MAE_Schematic.pptx
@@ -120,7 +120,7 @@
 <file path=ppt/revisionInfo.xml><?xml version="1.0" encoding="utf-8"?>
 <p1510:revInfo xmlns:a="http://schemas.openxmlformats.org/drawingml/2006/main" xmlns:r="http://schemas.openxmlformats.org/officeDocument/2006/relationships" xmlns:p1510="http://schemas.microsoft.com/office/powerpoint/2015/10/main">
   <p1510:revLst>
-    <p1510:client id="{A551F425-66D2-4759-ACAD-5E0B0275AB71}" v="55" dt="2026-02-03T21:16:37.453"/>
+    <p1510:client id="{A551F425-66D2-4759-ACAD-5E0B0275AB71}" v="57" dt="2026-02-08T23:19:53.522"/>
   </p1510:revLst>
 </p1510:revInfo>
 </file>
@@ -130,7 +130,7 @@
   <pc:docChgLst>
     <pc:chgData name="Fatima Pillosu" userId="a6295d4dc9e22643" providerId="LiveId" clId="{87453732-75AC-4426-B5D3-B7C69C2D4F54}"/>
     <pc:docChg chg="undo custSel addSld modSld sldOrd">
-      <pc:chgData name="Fatima Pillosu" userId="a6295d4dc9e22643" providerId="LiveId" clId="{87453732-75AC-4426-B5D3-B7C69C2D4F54}" dt="2026-02-08T23:15:50.669" v="1199" actId="20577"/>
+      <pc:chgData name="Fatima Pillosu" userId="a6295d4dc9e22643" providerId="LiveId" clId="{87453732-75AC-4426-B5D3-B7C69C2D4F54}" dt="2026-02-08T23:20:35.959" v="1288" actId="207"/>
       <pc:docMkLst>
         <pc:docMk/>
       </pc:docMkLst>
@@ -1314,7 +1314,7 @@
         </pc:cxnChg>
       </pc:sldChg>
       <pc:sldChg chg="addSp delSp modSp new mod">
-        <pc:chgData name="Fatima Pillosu" userId="a6295d4dc9e22643" providerId="LiveId" clId="{87453732-75AC-4426-B5D3-B7C69C2D4F54}" dt="2026-02-08T23:15:50.669" v="1199" actId="20577"/>
+        <pc:chgData name="Fatima Pillosu" userId="a6295d4dc9e22643" providerId="LiveId" clId="{87453732-75AC-4426-B5D3-B7C69C2D4F54}" dt="2026-02-08T23:20:35.959" v="1288" actId="207"/>
         <pc:sldMkLst>
           <pc:docMk/>
           <pc:sldMk cId="1065612441" sldId="262"/>
@@ -1392,7 +1392,7 @@
           </ac:spMkLst>
         </pc:spChg>
         <pc:spChg chg="add mod">
-          <ac:chgData name="Fatima Pillosu" userId="a6295d4dc9e22643" providerId="LiveId" clId="{87453732-75AC-4426-B5D3-B7C69C2D4F54}" dt="2026-02-03T21:12:21.273" v="1125" actId="1076"/>
+          <ac:chgData name="Fatima Pillosu" userId="a6295d4dc9e22643" providerId="LiveId" clId="{87453732-75AC-4426-B5D3-B7C69C2D4F54}" dt="2026-02-08T23:20:35.959" v="1288" actId="207"/>
           <ac:spMkLst>
             <pc:docMk/>
             <pc:sldMk cId="1065612441" sldId="262"/>
@@ -5995,8 +5995,8 @@
         </p:nvSpPr>
         <p:spPr>
           <a:xfrm>
-            <a:off x="2148382" y="4561759"/>
-            <a:ext cx="3422815" cy="1015663"/>
+            <a:off x="1950157" y="4434622"/>
+            <a:ext cx="3621040" cy="1261884"/>
           </a:xfrm>
           <a:prstGeom prst="rect">
             <a:avLst/>
@@ -6028,7 +6028,7 @@
                 </a:solidFill>
                 <a:latin typeface="Aptos" panose="020B0004020202020204" pitchFamily="34" charset="0"/>
               </a:rPr>
-              <a:t>(SUBJECTIVE) CATEGORIES OF SIMILARITY DEGREES BETWEEN ECFDs</a:t>
+              <a:t>(SUBJECTIVE) CATEGORIES OF SIMILARITY DEGREES BETWEEN ECDFs</a:t>
             </a:r>
           </a:p>
           <a:p>
@@ -6292,6 +6292,27 @@
                 <a:latin typeface="Aptos" panose="020B0004020202020204" pitchFamily="34" charset="0"/>
               </a:rPr>
               <a:t> ( &gt; 1 )</a:t>
+            </a:r>
+          </a:p>
+          <a:p>
+            <a:endParaRPr lang="en-GB" sz="800" dirty="0">
+              <a:solidFill>
+                <a:srgbClr val="FF0066"/>
+              </a:solidFill>
+              <a:latin typeface="Aptos" panose="020B0004020202020204" pitchFamily="34" charset="0"/>
+            </a:endParaRPr>
+          </a:p>
+          <a:p>
+            <a:r>
+              <a:rPr lang="en-GB" sz="800" dirty="0">
+                <a:solidFill>
+                  <a:schemeClr val="bg1">
+                    <a:lumMod val="50000"/>
+                  </a:schemeClr>
+                </a:solidFill>
+                <a:latin typeface="Aptos" panose="020B0004020202020204" pitchFamily="34" charset="0"/>
+              </a:rPr>
+              <a:t>CDF in grey -&gt; reference distribution computed from rain gauge observations.</a:t>
             </a:r>
           </a:p>
         </p:txBody>

</xml_diff>